<commit_message>
added slides for 110124
</commit_message>
<xml_diff>
--- a/ift/assets/slides/ift615-01-Intro.pptx
+++ b/ift/assets/slides/ift615-01-Intro.pptx
@@ -192,7 +192,7 @@
 <file path=ppt/revisionInfo.xml><?xml version="1.0" encoding="utf-8"?>
 <p1510:revInfo xmlns:a="http://schemas.openxmlformats.org/drawingml/2006/main" xmlns:r="http://schemas.openxmlformats.org/officeDocument/2006/relationships" xmlns:p1510="http://schemas.microsoft.com/office/powerpoint/2015/10/main">
   <p1510:revLst>
-    <p1510:client id="{7642A362-B159-4960-ABCC-9DCCA8534FF7}" v="9" dt="2023-05-01T09:52:16.609"/>
+    <p1510:client id="{66E14B12-2BA7-4FCF-B090-34275B0B1650}" v="7" dt="2024-01-10T22:25:02.546"/>
   </p1510:revLst>
 </p1510:revInfo>
 </file>
@@ -2587,6 +2587,225 @@
           </pc:sldLayoutMkLst>
         </pc:sldLayoutChg>
       </pc:sldMasterChg>
+    </pc:docChg>
+  </pc:docChgLst>
+  <pc:docChgLst>
+    <pc:chgData name="Froduald Kabanza" userId="edf393d0-642b-4b9e-8c75-f62133241689" providerId="ADAL" clId="{66E14B12-2BA7-4FCF-B090-34275B0B1650}"/>
+    <pc:docChg chg="undo custSel modSld">
+      <pc:chgData name="Froduald Kabanza" userId="edf393d0-642b-4b9e-8c75-f62133241689" providerId="ADAL" clId="{66E14B12-2BA7-4FCF-B090-34275B0B1650}" dt="2024-01-10T22:25:02.546" v="300" actId="1076"/>
+      <pc:docMkLst>
+        <pc:docMk/>
+      </pc:docMkLst>
+      <pc:sldChg chg="modSp mod">
+        <pc:chgData name="Froduald Kabanza" userId="edf393d0-642b-4b9e-8c75-f62133241689" providerId="ADAL" clId="{66E14B12-2BA7-4FCF-B090-34275B0B1650}" dt="2024-01-10T22:15:33.717" v="233" actId="20577"/>
+        <pc:sldMkLst>
+          <pc:docMk/>
+          <pc:sldMk cId="0" sldId="700"/>
+        </pc:sldMkLst>
+        <pc:spChg chg="mod">
+          <ac:chgData name="Froduald Kabanza" userId="edf393d0-642b-4b9e-8c75-f62133241689" providerId="ADAL" clId="{66E14B12-2BA7-4FCF-B090-34275B0B1650}" dt="2024-01-10T22:15:33.717" v="233" actId="20577"/>
+          <ac:spMkLst>
+            <pc:docMk/>
+            <pc:sldMk cId="0" sldId="700"/>
+            <ac:spMk id="21510" creationId="{00000000-0000-0000-0000-000000000000}"/>
+          </ac:spMkLst>
+        </pc:spChg>
+      </pc:sldChg>
+      <pc:sldChg chg="modSp mod">
+        <pc:chgData name="Froduald Kabanza" userId="edf393d0-642b-4b9e-8c75-f62133241689" providerId="ADAL" clId="{66E14B12-2BA7-4FCF-B090-34275B0B1650}" dt="2024-01-10T22:25:02.546" v="300" actId="1076"/>
+        <pc:sldMkLst>
+          <pc:docMk/>
+          <pc:sldMk cId="4079790285" sldId="706"/>
+        </pc:sldMkLst>
+        <pc:spChg chg="mod">
+          <ac:chgData name="Froduald Kabanza" userId="edf393d0-642b-4b9e-8c75-f62133241689" providerId="ADAL" clId="{66E14B12-2BA7-4FCF-B090-34275B0B1650}" dt="2024-01-10T22:25:02.546" v="300" actId="1076"/>
+          <ac:spMkLst>
+            <pc:docMk/>
+            <pc:sldMk cId="4079790285" sldId="706"/>
+            <ac:spMk id="7171" creationId="{00000000-0000-0000-0000-000000000000}"/>
+          </ac:spMkLst>
+        </pc:spChg>
+        <pc:picChg chg="mod">
+          <ac:chgData name="Froduald Kabanza" userId="edf393d0-642b-4b9e-8c75-f62133241689" providerId="ADAL" clId="{66E14B12-2BA7-4FCF-B090-34275B0B1650}" dt="2024-01-10T22:11:05.230" v="36" actId="1076"/>
+          <ac:picMkLst>
+            <pc:docMk/>
+            <pc:sldMk cId="4079790285" sldId="706"/>
+            <ac:picMk id="2" creationId="{A3F7B5CA-5A51-E9D3-4709-89BDE2055729}"/>
+          </ac:picMkLst>
+        </pc:picChg>
+        <pc:picChg chg="mod">
+          <ac:chgData name="Froduald Kabanza" userId="edf393d0-642b-4b9e-8c75-f62133241689" providerId="ADAL" clId="{66E14B12-2BA7-4FCF-B090-34275B0B1650}" dt="2024-01-10T22:11:05.230" v="36" actId="1076"/>
+          <ac:picMkLst>
+            <pc:docMk/>
+            <pc:sldMk cId="4079790285" sldId="706"/>
+            <ac:picMk id="3" creationId="{6A654781-6861-9762-76D1-E86D9624EC11}"/>
+          </ac:picMkLst>
+        </pc:picChg>
+        <pc:picChg chg="mod">
+          <ac:chgData name="Froduald Kabanza" userId="edf393d0-642b-4b9e-8c75-f62133241689" providerId="ADAL" clId="{66E14B12-2BA7-4FCF-B090-34275B0B1650}" dt="2024-01-10T22:11:05.230" v="36" actId="1076"/>
+          <ac:picMkLst>
+            <pc:docMk/>
+            <pc:sldMk cId="4079790285" sldId="706"/>
+            <ac:picMk id="5" creationId="{D6637DB4-625A-9D77-BA2B-31F7B5F35042}"/>
+          </ac:picMkLst>
+        </pc:picChg>
+        <pc:picChg chg="mod">
+          <ac:chgData name="Froduald Kabanza" userId="edf393d0-642b-4b9e-8c75-f62133241689" providerId="ADAL" clId="{66E14B12-2BA7-4FCF-B090-34275B0B1650}" dt="2024-01-10T22:11:05.230" v="36" actId="1076"/>
+          <ac:picMkLst>
+            <pc:docMk/>
+            <pc:sldMk cId="4079790285" sldId="706"/>
+            <ac:picMk id="7" creationId="{5144745D-13A6-B061-C767-D42E42325780}"/>
+          </ac:picMkLst>
+        </pc:picChg>
+        <pc:picChg chg="mod">
+          <ac:chgData name="Froduald Kabanza" userId="edf393d0-642b-4b9e-8c75-f62133241689" providerId="ADAL" clId="{66E14B12-2BA7-4FCF-B090-34275B0B1650}" dt="2024-01-10T22:11:05.230" v="36" actId="1076"/>
+          <ac:picMkLst>
+            <pc:docMk/>
+            <pc:sldMk cId="4079790285" sldId="706"/>
+            <ac:picMk id="9" creationId="{3B6DB229-9C30-670E-A47E-0D9F449AE9CB}"/>
+          </ac:picMkLst>
+        </pc:picChg>
+        <pc:picChg chg="mod">
+          <ac:chgData name="Froduald Kabanza" userId="edf393d0-642b-4b9e-8c75-f62133241689" providerId="ADAL" clId="{66E14B12-2BA7-4FCF-B090-34275B0B1650}" dt="2024-01-10T22:11:05.230" v="36" actId="1076"/>
+          <ac:picMkLst>
+            <pc:docMk/>
+            <pc:sldMk cId="4079790285" sldId="706"/>
+            <ac:picMk id="12" creationId="{EC58F3E6-1F3B-30E2-FC4B-198B6364DD98}"/>
+          </ac:picMkLst>
+        </pc:picChg>
+        <pc:picChg chg="mod">
+          <ac:chgData name="Froduald Kabanza" userId="edf393d0-642b-4b9e-8c75-f62133241689" providerId="ADAL" clId="{66E14B12-2BA7-4FCF-B090-34275B0B1650}" dt="2024-01-10T22:11:05.230" v="36" actId="1076"/>
+          <ac:picMkLst>
+            <pc:docMk/>
+            <pc:sldMk cId="4079790285" sldId="706"/>
+            <ac:picMk id="15" creationId="{81466BE9-78E7-23FD-2BB1-704422725039}"/>
+          </ac:picMkLst>
+        </pc:picChg>
+      </pc:sldChg>
+      <pc:sldChg chg="modSp mod">
+        <pc:chgData name="Froduald Kabanza" userId="edf393d0-642b-4b9e-8c75-f62133241689" providerId="ADAL" clId="{66E14B12-2BA7-4FCF-B090-34275B0B1650}" dt="2024-01-10T22:17:07.154" v="242" actId="1582"/>
+        <pc:sldMkLst>
+          <pc:docMk/>
+          <pc:sldMk cId="918217908" sldId="711"/>
+        </pc:sldMkLst>
+        <pc:spChg chg="mod">
+          <ac:chgData name="Froduald Kabanza" userId="edf393d0-642b-4b9e-8c75-f62133241689" providerId="ADAL" clId="{66E14B12-2BA7-4FCF-B090-34275B0B1650}" dt="2024-01-10T22:16:47.258" v="239" actId="1582"/>
+          <ac:spMkLst>
+            <pc:docMk/>
+            <pc:sldMk cId="918217908" sldId="711"/>
+            <ac:spMk id="8" creationId="{00000000-0000-0000-0000-000000000000}"/>
+          </ac:spMkLst>
+        </pc:spChg>
+        <pc:spChg chg="mod">
+          <ac:chgData name="Froduald Kabanza" userId="edf393d0-642b-4b9e-8c75-f62133241689" providerId="ADAL" clId="{66E14B12-2BA7-4FCF-B090-34275B0B1650}" dt="2024-01-10T22:17:07.154" v="242" actId="1582"/>
+          <ac:spMkLst>
+            <pc:docMk/>
+            <pc:sldMk cId="918217908" sldId="711"/>
+            <ac:spMk id="9" creationId="{00000000-0000-0000-0000-000000000000}"/>
+          </ac:spMkLst>
+        </pc:spChg>
+        <pc:spChg chg="mod">
+          <ac:chgData name="Froduald Kabanza" userId="edf393d0-642b-4b9e-8c75-f62133241689" providerId="ADAL" clId="{66E14B12-2BA7-4FCF-B090-34275B0B1650}" dt="2024-01-10T22:16:58.127" v="241" actId="1582"/>
+          <ac:spMkLst>
+            <pc:docMk/>
+            <pc:sldMk cId="918217908" sldId="711"/>
+            <ac:spMk id="17" creationId="{950B307E-41E4-4877-AEC1-4E2B963908D6}"/>
+          </ac:spMkLst>
+        </pc:spChg>
+        <pc:spChg chg="mod">
+          <ac:chgData name="Froduald Kabanza" userId="edf393d0-642b-4b9e-8c75-f62133241689" providerId="ADAL" clId="{66E14B12-2BA7-4FCF-B090-34275B0B1650}" dt="2024-01-10T22:16:40.431" v="238" actId="1582"/>
+          <ac:spMkLst>
+            <pc:docMk/>
+            <pc:sldMk cId="918217908" sldId="711"/>
+            <ac:spMk id="18" creationId="{AD870AEB-30F7-421A-823A-E7818AD251FB}"/>
+          </ac:spMkLst>
+        </pc:spChg>
+        <pc:spChg chg="mod">
+          <ac:chgData name="Froduald Kabanza" userId="edf393d0-642b-4b9e-8c75-f62133241689" providerId="ADAL" clId="{66E14B12-2BA7-4FCF-B090-34275B0B1650}" dt="2024-01-10T22:16:02.190" v="234" actId="1076"/>
+          <ac:spMkLst>
+            <pc:docMk/>
+            <pc:sldMk cId="918217908" sldId="711"/>
+            <ac:spMk id="34" creationId="{00000000-0000-0000-0000-000000000000}"/>
+          </ac:spMkLst>
+        </pc:spChg>
+        <pc:spChg chg="mod">
+          <ac:chgData name="Froduald Kabanza" userId="edf393d0-642b-4b9e-8c75-f62133241689" providerId="ADAL" clId="{66E14B12-2BA7-4FCF-B090-34275B0B1650}" dt="2024-01-10T22:16:52.629" v="240" actId="1582"/>
+          <ac:spMkLst>
+            <pc:docMk/>
+            <pc:sldMk cId="918217908" sldId="711"/>
+            <ac:spMk id="38" creationId="{00000000-0000-0000-0000-000000000000}"/>
+          </ac:spMkLst>
+        </pc:spChg>
+        <pc:cxnChg chg="mod">
+          <ac:chgData name="Froduald Kabanza" userId="edf393d0-642b-4b9e-8c75-f62133241689" providerId="ADAL" clId="{66E14B12-2BA7-4FCF-B090-34275B0B1650}" dt="2024-01-10T22:16:06.856" v="235" actId="14100"/>
+          <ac:cxnSpMkLst>
+            <pc:docMk/>
+            <pc:sldMk cId="918217908" sldId="711"/>
+            <ac:cxnSpMk id="35" creationId="{00000000-0000-0000-0000-000000000000}"/>
+          </ac:cxnSpMkLst>
+        </pc:cxnChg>
+        <pc:cxnChg chg="mod">
+          <ac:chgData name="Froduald Kabanza" userId="edf393d0-642b-4b9e-8c75-f62133241689" providerId="ADAL" clId="{66E14B12-2BA7-4FCF-B090-34275B0B1650}" dt="2024-01-10T22:16:12.086" v="236" actId="14100"/>
+          <ac:cxnSpMkLst>
+            <pc:docMk/>
+            <pc:sldMk cId="918217908" sldId="711"/>
+            <ac:cxnSpMk id="42" creationId="{00000000-0000-0000-0000-000000000000}"/>
+          </ac:cxnSpMkLst>
+        </pc:cxnChg>
+        <pc:cxnChg chg="mod">
+          <ac:chgData name="Froduald Kabanza" userId="edf393d0-642b-4b9e-8c75-f62133241689" providerId="ADAL" clId="{66E14B12-2BA7-4FCF-B090-34275B0B1650}" dt="2024-01-10T22:16:15.791" v="237" actId="14100"/>
+          <ac:cxnSpMkLst>
+            <pc:docMk/>
+            <pc:sldMk cId="918217908" sldId="711"/>
+            <ac:cxnSpMk id="44" creationId="{00000000-0000-0000-0000-000000000000}"/>
+          </ac:cxnSpMkLst>
+        </pc:cxnChg>
+      </pc:sldChg>
+      <pc:sldChg chg="modSp">
+        <pc:chgData name="Froduald Kabanza" userId="edf393d0-642b-4b9e-8c75-f62133241689" providerId="ADAL" clId="{66E14B12-2BA7-4FCF-B090-34275B0B1650}" dt="2024-01-10T22:12:38.017" v="54" actId="20577"/>
+        <pc:sldMkLst>
+          <pc:docMk/>
+          <pc:sldMk cId="2960840821" sldId="713"/>
+        </pc:sldMkLst>
+        <pc:spChg chg="mod">
+          <ac:chgData name="Froduald Kabanza" userId="edf393d0-642b-4b9e-8c75-f62133241689" providerId="ADAL" clId="{66E14B12-2BA7-4FCF-B090-34275B0B1650}" dt="2024-01-10T22:12:38.017" v="54" actId="20577"/>
+          <ac:spMkLst>
+            <pc:docMk/>
+            <pc:sldMk cId="2960840821" sldId="713"/>
+            <ac:spMk id="95" creationId="{E6C2EEAC-B9A8-4DDE-BEEE-172C2C51C115}"/>
+          </ac:spMkLst>
+        </pc:spChg>
+      </pc:sldChg>
+      <pc:sldChg chg="mod modShow">
+        <pc:chgData name="Froduald Kabanza" userId="edf393d0-642b-4b9e-8c75-f62133241689" providerId="ADAL" clId="{66E14B12-2BA7-4FCF-B090-34275B0B1650}" dt="2024-01-10T22:12:25.422" v="53" actId="729"/>
+        <pc:sldMkLst>
+          <pc:docMk/>
+          <pc:sldMk cId="1630510579" sldId="4500"/>
+        </pc:sldMkLst>
+      </pc:sldChg>
+      <pc:sldChg chg="addSp delSp modSp mod">
+        <pc:chgData name="Froduald Kabanza" userId="edf393d0-642b-4b9e-8c75-f62133241689" providerId="ADAL" clId="{66E14B12-2BA7-4FCF-B090-34275B0B1650}" dt="2024-01-10T22:23:51.956" v="296" actId="1076"/>
+        <pc:sldMkLst>
+          <pc:docMk/>
+          <pc:sldMk cId="2074318206" sldId="4503"/>
+        </pc:sldMkLst>
+        <pc:graphicFrameChg chg="del mod">
+          <ac:chgData name="Froduald Kabanza" userId="edf393d0-642b-4b9e-8c75-f62133241689" providerId="ADAL" clId="{66E14B12-2BA7-4FCF-B090-34275B0B1650}" dt="2024-01-10T22:18:32.735" v="244" actId="478"/>
+          <ac:graphicFrameMkLst>
+            <pc:docMk/>
+            <pc:sldMk cId="2074318206" sldId="4503"/>
+            <ac:graphicFrameMk id="2" creationId="{7B3B459A-0E5D-FD53-4C38-BF00A6F06489}"/>
+          </ac:graphicFrameMkLst>
+        </pc:graphicFrameChg>
+        <pc:graphicFrameChg chg="add mod modGraphic">
+          <ac:chgData name="Froduald Kabanza" userId="edf393d0-642b-4b9e-8c75-f62133241689" providerId="ADAL" clId="{66E14B12-2BA7-4FCF-B090-34275B0B1650}" dt="2024-01-10T22:23:51.956" v="296" actId="1076"/>
+          <ac:graphicFrameMkLst>
+            <pc:docMk/>
+            <pc:sldMk cId="2074318206" sldId="4503"/>
+            <ac:graphicFrameMk id="3" creationId="{FC016AA9-4AA9-8F2C-C802-CCB8A388C327}"/>
+          </ac:graphicFrameMkLst>
+        </pc:graphicFrameChg>
+      </pc:sldChg>
     </pc:docChg>
   </pc:docChgLst>
   <pc:docChgLst>
@@ -12097,7 +12316,7 @@
           <a:solidFill>
             <a:schemeClr val="bg1"/>
           </a:solidFill>
-          <a:ln w="25400">
+          <a:ln w="76200">
             <a:solidFill>
               <a:srgbClr val="000090"/>
             </a:solidFill>
@@ -12167,7 +12386,7 @@
           <a:solidFill>
             <a:schemeClr val="bg1"/>
           </a:solidFill>
-          <a:ln w="25400">
+          <a:ln w="76200">
             <a:solidFill>
               <a:srgbClr val="800000"/>
             </a:solidFill>
@@ -12329,8 +12548,8 @@
         </p:nvCxnSpPr>
         <p:spPr bwMode="auto">
           <a:xfrm flipH="1">
-            <a:off x="3389107" y="4023161"/>
-            <a:ext cx="315186" cy="882261"/>
+            <a:off x="3389107" y="4044607"/>
+            <a:ext cx="315185" cy="860815"/>
           </a:xfrm>
           <a:prstGeom prst="straightConnector1">
             <a:avLst/>
@@ -12398,7 +12617,7 @@
         </p:nvSpPr>
         <p:spPr bwMode="auto">
           <a:xfrm>
-            <a:off x="5791200" y="4737209"/>
+            <a:off x="5439709" y="5146088"/>
             <a:ext cx="2895600" cy="646331"/>
           </a:xfrm>
           <a:prstGeom prst="rect">
@@ -12433,7 +12652,7 @@
               <a:defRPr/>
             </a:pPr>
             <a:r>
-              <a:rPr lang="fr-CA" altLang="ko-KR">
+              <a:rPr lang="fr-CA" altLang="ko-KR" dirty="0">
                 <a:latin typeface="Calibri" charset="0"/>
                 <a:ea typeface="+mn-ea"/>
               </a:rPr>
@@ -12445,20 +12664,20 @@
               <a:defRPr/>
             </a:pPr>
             <a:r>
-              <a:rPr lang="en-CA">
+              <a:rPr lang="en-CA" dirty="0">
                 <a:latin typeface="Calibri" charset="0"/>
                 <a:ea typeface="+mn-ea"/>
               </a:rPr>
               <a:t>Informatique </a:t>
             </a:r>
             <a:r>
-              <a:rPr lang="en-CA" err="1">
+              <a:rPr lang="en-CA" dirty="0" err="1">
                 <a:latin typeface="Calibri" charset="0"/>
                 <a:ea typeface="+mn-ea"/>
               </a:rPr>
               <a:t>cognitif</a:t>
             </a:r>
-            <a:endParaRPr lang="fr-FR">
+            <a:endParaRPr lang="fr-FR" dirty="0">
               <a:latin typeface="+mn-lt"/>
               <a:ea typeface="+mn-ea"/>
             </a:endParaRPr>
@@ -12476,8 +12695,8 @@
         </p:nvCxnSpPr>
         <p:spPr bwMode="auto">
           <a:xfrm>
-            <a:off x="5049719" y="4044871"/>
-            <a:ext cx="2189281" cy="692338"/>
+            <a:off x="4836907" y="4044607"/>
+            <a:ext cx="2050602" cy="1101481"/>
           </a:xfrm>
           <a:prstGeom prst="straightConnector1">
             <a:avLst/>
@@ -12519,7 +12738,7 @@
           <a:solidFill>
             <a:schemeClr val="bg1"/>
           </a:solidFill>
-          <a:ln w="25400">
+          <a:ln w="76200">
             <a:solidFill>
               <a:srgbClr val="800000"/>
             </a:solidFill>
@@ -12608,14 +12827,13 @@
           <p:cNvPr id="42" name="Connecteur droit avec flèche 46"/>
           <p:cNvCxnSpPr>
             <a:cxnSpLocks noChangeShapeType="1"/>
-            <a:endCxn id="38" idx="2"/>
           </p:cNvCxnSpPr>
           <p:nvPr/>
         </p:nvCxnSpPr>
         <p:spPr bwMode="auto">
           <a:xfrm flipV="1">
-            <a:off x="5049719" y="2719505"/>
-            <a:ext cx="1535231" cy="669096"/>
+            <a:off x="5049719" y="2752209"/>
+            <a:ext cx="411429" cy="636392"/>
           </a:xfrm>
           <a:prstGeom prst="straightConnector1">
             <a:avLst/>
@@ -12663,7 +12881,7 @@
           <a:solidFill>
             <a:schemeClr val="bg1"/>
           </a:solidFill>
-          <a:ln w="25400">
+          <a:ln w="76200">
             <a:solidFill>
               <a:srgbClr val="800000"/>
             </a:solidFill>
@@ -12793,7 +13011,7 @@
           <a:solidFill>
             <a:schemeClr val="bg1"/>
           </a:solidFill>
-          <a:ln w="25400">
+          <a:ln w="76200">
             <a:solidFill>
               <a:srgbClr val="800000"/>
             </a:solidFill>
@@ -13696,10 +13914,10 @@
       </p:sp>
       <p:graphicFrame>
         <p:nvGraphicFramePr>
-          <p:cNvPr id="2" name="Table 1">
+          <p:cNvPr id="3" name="Table 2">
             <a:extLst>
               <a:ext uri="{FF2B5EF4-FFF2-40B4-BE49-F238E27FC236}">
-                <a16:creationId xmlns:a16="http://schemas.microsoft.com/office/drawing/2014/main" id="{7B3B459A-0E5D-FD53-4C38-BF00A6F06489}"/>
+                <a16:creationId xmlns:a16="http://schemas.microsoft.com/office/drawing/2014/main" id="{FC016AA9-4AA9-8F2C-C802-CCB8A388C327}"/>
               </a:ext>
             </a:extLst>
           </p:cNvPr>
@@ -13709,14 +13927,14 @@
           <p:nvPr>
             <p:extLst>
               <p:ext uri="{D42A27DB-BD31-4B8C-83A1-F6EECF244321}">
-                <p14:modId xmlns:p14="http://schemas.microsoft.com/office/powerpoint/2010/main" val="3922914464"/>
+                <p14:modId xmlns:p14="http://schemas.microsoft.com/office/powerpoint/2010/main" val="3153727818"/>
               </p:ext>
             </p:extLst>
           </p:nvPr>
         </p:nvGraphicFramePr>
         <p:xfrm>
-          <a:off x="524106" y="1474746"/>
-          <a:ext cx="8095787" cy="4024694"/>
+          <a:off x="553532" y="1605868"/>
+          <a:ext cx="8036936" cy="3369541"/>
         </p:xfrm>
         <a:graphic>
           <a:graphicData uri="http://schemas.openxmlformats.org/drawingml/2006/table">
@@ -13725,49 +13943,52 @@
                 <a:tableStyleId>{5C22544A-7EE6-4342-B048-85BDC9FD1C3A}</a:tableStyleId>
               </a:tblPr>
               <a:tblGrid>
-                <a:gridCol w="1195430">
+                <a:gridCol w="921123">
                   <a:extLst>
                     <a:ext uri="{9D8B030D-6E8A-4147-A177-3AD203B41FA5}">
-                      <a16:colId xmlns:a16="http://schemas.microsoft.com/office/drawing/2014/main" val="294174165"/>
+                      <a16:colId xmlns:a16="http://schemas.microsoft.com/office/drawing/2014/main" val="966508513"/>
                     </a:ext>
                   </a:extLst>
                 </a:gridCol>
-                <a:gridCol w="1597853">
+                <a:gridCol w="1889312">
                   <a:extLst>
                     <a:ext uri="{9D8B030D-6E8A-4147-A177-3AD203B41FA5}">
-                      <a16:colId xmlns:a16="http://schemas.microsoft.com/office/drawing/2014/main" val="2678101776"/>
+                      <a16:colId xmlns:a16="http://schemas.microsoft.com/office/drawing/2014/main" val="1855733920"/>
                     </a:ext>
                   </a:extLst>
                 </a:gridCol>
-                <a:gridCol w="2224767">
+                <a:gridCol w="1942641">
                   <a:extLst>
                     <a:ext uri="{9D8B030D-6E8A-4147-A177-3AD203B41FA5}">
-                      <a16:colId xmlns:a16="http://schemas.microsoft.com/office/drawing/2014/main" val="1903016084"/>
+                      <a16:colId xmlns:a16="http://schemas.microsoft.com/office/drawing/2014/main" val="651136222"/>
                     </a:ext>
                   </a:extLst>
                 </a:gridCol>
-                <a:gridCol w="947268">
+                <a:gridCol w="746771">
                   <a:extLst>
                     <a:ext uri="{9D8B030D-6E8A-4147-A177-3AD203B41FA5}">
-                      <a16:colId xmlns:a16="http://schemas.microsoft.com/office/drawing/2014/main" val="3523609534"/>
+                      <a16:colId xmlns:a16="http://schemas.microsoft.com/office/drawing/2014/main" val="3297811800"/>
                     </a:ext>
                   </a:extLst>
                 </a:gridCol>
-                <a:gridCol w="2130469">
+                <a:gridCol w="2537089">
                   <a:extLst>
                     <a:ext uri="{9D8B030D-6E8A-4147-A177-3AD203B41FA5}">
-                      <a16:colId xmlns:a16="http://schemas.microsoft.com/office/drawing/2014/main" val="1966663824"/>
+                      <a16:colId xmlns:a16="http://schemas.microsoft.com/office/drawing/2014/main" val="3189292055"/>
                     </a:ext>
                   </a:extLst>
                 </a:gridCol>
               </a:tblGrid>
-              <a:tr h="310503">
+              <a:tr h="436837">
                 <a:tc>
                   <a:txBody>
                     <a:bodyPr/>
                     <a:lstStyle/>
                     <a:p>
-                      <a:pPr algn="l">
+                      <a:pPr marL="72000" algn="l">
+                        <a:spcBef>
+                          <a:spcPts val="300"/>
+                        </a:spcBef>
                         <a:tabLst>
                           <a:tab pos="457200" algn="l"/>
                           <a:tab pos="3060065" algn="ctr"/>
@@ -13779,12 +14000,12 @@
                         </a:tabLst>
                       </a:pPr>
                       <a:r>
-                        <a:rPr lang="fr-FR" sz="1600" dirty="0">
+                        <a:rPr lang="fr-FR" sz="1300" dirty="0">
                           <a:effectLst/>
                         </a:rPr>
-                        <a:t>TP/Quiz</a:t>
+                        <a:t>Travail pratique</a:t>
                       </a:r>
-                      <a:endParaRPr lang="en-US" sz="1600" dirty="0">
+                      <a:endParaRPr lang="en-CA" sz="2000" dirty="0">
                         <a:solidFill>
                           <a:srgbClr val="00000A"/>
                         </a:solidFill>
@@ -13795,16 +14016,16 @@
                       </a:endParaRPr>
                     </a:p>
                   </a:txBody>
-                  <a:tcPr marL="62089" marR="62089" marT="0" marB="0"/>
+                  <a:tcPr marL="18945" marR="18945" marT="0" marB="0"/>
                 </a:tc>
                 <a:tc>
                   <a:txBody>
                     <a:bodyPr/>
                     <a:lstStyle/>
                     <a:p>
-                      <a:pPr marL="457200" indent="-228600" algn="l">
+                      <a:pPr marL="72000" indent="0" algn="l">
                         <a:spcBef>
-                          <a:spcPts val="600"/>
+                          <a:spcPts val="300"/>
                         </a:spcBef>
                         <a:spcAft>
                           <a:spcPts val="0"/>
@@ -13816,12 +14037,12 @@
                         </a:tabLst>
                       </a:pPr>
                       <a:r>
-                        <a:rPr lang="fr-CA" sz="1600" dirty="0">
+                        <a:rPr lang="fr-CA" sz="1300" dirty="0">
                           <a:effectLst/>
                         </a:rPr>
-                        <a:t>Énoncé</a:t>
+                        <a:t>Publication de l’énoncé</a:t>
                       </a:r>
-                      <a:endParaRPr lang="en-US" sz="1600" b="1" dirty="0">
+                      <a:endParaRPr lang="en-CA" sz="1300" b="1" dirty="0">
                         <a:effectLst/>
                         <a:latin typeface="Times New Roman" panose="02020603050405020304" pitchFamily="18" charset="0"/>
                         <a:ea typeface="Times New Roman" panose="02020603050405020304" pitchFamily="18" charset="0"/>
@@ -13829,16 +14050,16 @@
                       </a:endParaRPr>
                     </a:p>
                   </a:txBody>
-                  <a:tcPr marL="62089" marR="62089" marT="0" marB="0"/>
+                  <a:tcPr marL="18945" marR="18945" marT="0" marB="0"/>
                 </a:tc>
                 <a:tc>
                   <a:txBody>
                     <a:bodyPr/>
                     <a:lstStyle/>
                     <a:p>
-                      <a:pPr marL="457200" indent="-228600" algn="l">
+                      <a:pPr marL="72000" indent="0" algn="l">
                         <a:spcBef>
-                          <a:spcPts val="600"/>
+                          <a:spcPts val="300"/>
                         </a:spcBef>
                         <a:spcAft>
                           <a:spcPts val="0"/>
@@ -13850,12 +14071,24 @@
                         </a:tabLst>
                       </a:pPr>
                       <a:r>
-                        <a:rPr lang="en-CA" sz="1600" dirty="0">
+                        <a:rPr lang="en-CA" sz="1300" dirty="0">
                           <a:effectLst/>
                         </a:rPr>
-                        <a:t>Remise</a:t>
+                        <a:t>Date </a:t>
                       </a:r>
-                      <a:endParaRPr lang="en-US" sz="1600" b="1" dirty="0">
+                      <a:r>
+                        <a:rPr lang="en-CA" sz="1300" dirty="0" err="1">
+                          <a:effectLst/>
+                        </a:rPr>
+                        <a:t>limite</a:t>
+                      </a:r>
+                      <a:r>
+                        <a:rPr lang="en-CA" sz="1300" dirty="0">
+                          <a:effectLst/>
+                        </a:rPr>
+                        <a:t> de remise</a:t>
+                      </a:r>
+                      <a:endParaRPr lang="en-CA" sz="1300" b="1" dirty="0">
                         <a:effectLst/>
                         <a:latin typeface="Times New Roman" panose="02020603050405020304" pitchFamily="18" charset="0"/>
                         <a:ea typeface="Times New Roman" panose="02020603050405020304" pitchFamily="18" charset="0"/>
@@ -13863,16 +14096,16 @@
                       </a:endParaRPr>
                     </a:p>
                   </a:txBody>
-                  <a:tcPr marL="62089" marR="62089" marT="0" marB="0"/>
+                  <a:tcPr marL="18945" marR="18945" marT="0" marB="0"/>
                 </a:tc>
                 <a:tc>
                   <a:txBody>
                     <a:bodyPr/>
                     <a:lstStyle/>
                     <a:p>
-                      <a:pPr marL="457200" indent="-228600" algn="l">
+                      <a:pPr marL="72000" indent="0" algn="l">
                         <a:spcBef>
-                          <a:spcPts val="600"/>
+                          <a:spcPts val="300"/>
                         </a:spcBef>
                         <a:spcAft>
                           <a:spcPts val="0"/>
@@ -13884,12 +14117,12 @@
                         </a:tabLst>
                       </a:pPr>
                       <a:r>
-                        <a:rPr lang="fr-CA" sz="1600" dirty="0">
+                        <a:rPr lang="fr-CA" sz="1300" dirty="0" err="1">
                           <a:effectLst/>
                         </a:rPr>
-                        <a:t>Poids</a:t>
+                        <a:t>Pondé-ration</a:t>
                       </a:r>
-                      <a:endParaRPr lang="en-US" sz="1600" b="1" dirty="0">
+                      <a:endParaRPr lang="en-CA" sz="1300" b="1" dirty="0">
                         <a:effectLst/>
                         <a:latin typeface="Times New Roman" panose="02020603050405020304" pitchFamily="18" charset="0"/>
                         <a:ea typeface="Times New Roman" panose="02020603050405020304" pitchFamily="18" charset="0"/>
@@ -13897,16 +14130,16 @@
                       </a:endParaRPr>
                     </a:p>
                   </a:txBody>
-                  <a:tcPr marL="62089" marR="62089" marT="0" marB="0"/>
+                  <a:tcPr marL="18945" marR="18945" marT="0" marB="0"/>
                 </a:tc>
                 <a:tc>
                   <a:txBody>
                     <a:bodyPr/>
                     <a:lstStyle/>
                     <a:p>
-                      <a:pPr marL="457200" indent="-228600" algn="l">
+                      <a:pPr marL="72000" indent="0" algn="l">
                         <a:spcBef>
-                          <a:spcPts val="600"/>
+                          <a:spcPts val="300"/>
                         </a:spcBef>
                         <a:spcAft>
                           <a:spcPts val="0"/>
@@ -13918,12 +14151,12 @@
                         </a:tabLst>
                       </a:pPr>
                       <a:r>
-                        <a:rPr lang="fr-CA" sz="1600" dirty="0">
+                        <a:rPr lang="fr-CA" sz="1300" dirty="0">
                           <a:effectLst/>
                         </a:rPr>
                         <a:t>Sujet</a:t>
                       </a:r>
-                      <a:endParaRPr lang="en-US" sz="1600" b="1" dirty="0">
+                      <a:endParaRPr lang="en-CA" sz="1300" b="1" dirty="0">
                         <a:effectLst/>
                         <a:latin typeface="Times New Roman" panose="02020603050405020304" pitchFamily="18" charset="0"/>
                         <a:ea typeface="Times New Roman" panose="02020603050405020304" pitchFamily="18" charset="0"/>
@@ -13931,23 +14164,23 @@
                       </a:endParaRPr>
                     </a:p>
                   </a:txBody>
-                  <a:tcPr marL="62089" marR="62089" marT="0" marB="0"/>
+                  <a:tcPr marL="18945" marR="18945" marT="0" marB="0"/>
                 </a:tc>
                 <a:extLst>
                   <a:ext uri="{0D108BD9-81ED-4DB2-BD59-A6C34878D82A}">
-                    <a16:rowId xmlns:a16="http://schemas.microsoft.com/office/drawing/2014/main" val="38668393"/>
+                    <a16:rowId xmlns:a16="http://schemas.microsoft.com/office/drawing/2014/main" val="360670896"/>
                   </a:ext>
                 </a:extLst>
               </a:tr>
-              <a:tr h="453302">
+              <a:tr h="436837">
                 <a:tc>
                   <a:txBody>
                     <a:bodyPr/>
                     <a:lstStyle/>
                     <a:p>
-                      <a:pPr marL="457200" indent="-228600" algn="l">
+                      <a:pPr marL="108000" indent="0" algn="l">
                         <a:spcBef>
-                          <a:spcPts val="600"/>
+                          <a:spcPts val="300"/>
                         </a:spcBef>
                         <a:spcAft>
                           <a:spcPts val="0"/>
@@ -13959,12 +14192,12 @@
                         </a:tabLst>
                       </a:pPr>
                       <a:r>
-                        <a:rPr lang="fr-CA" sz="1600">
+                        <a:rPr lang="fr-CA" sz="1300" dirty="0">
                           <a:effectLst/>
                         </a:rPr>
-                        <a:t>TP1</a:t>
+                        <a:t>TP 1</a:t>
                       </a:r>
-                      <a:endParaRPr lang="en-US" sz="1600" b="1">
+                      <a:endParaRPr lang="en-CA" sz="1300" b="1" dirty="0">
                         <a:effectLst/>
                         <a:latin typeface="Times New Roman" panose="02020603050405020304" pitchFamily="18" charset="0"/>
                         <a:ea typeface="Times New Roman" panose="02020603050405020304" pitchFamily="18" charset="0"/>
@@ -13972,16 +14205,16 @@
                       </a:endParaRPr>
                     </a:p>
                   </a:txBody>
-                  <a:tcPr marL="62089" marR="62089" marT="0" marB="0"/>
+                  <a:tcPr marL="18945" marR="18945" marT="0" marB="0"/>
                 </a:tc>
                 <a:tc>
                   <a:txBody>
                     <a:bodyPr/>
                     <a:lstStyle/>
                     <a:p>
-                      <a:pPr marL="0" indent="0" algn="l">
+                      <a:pPr marL="108000" indent="0" algn="l">
                         <a:spcBef>
-                          <a:spcPts val="0"/>
+                          <a:spcPts val="300"/>
                         </a:spcBef>
                         <a:spcAft>
                           <a:spcPts val="0"/>
@@ -13993,18 +14226,24 @@
                         </a:tabLst>
                       </a:pPr>
                       <a:r>
-                        <a:rPr lang="en-CA" sz="1600" dirty="0">
+                        <a:rPr lang="en-CA" sz="1300" dirty="0" err="1">
                           <a:effectLst/>
                         </a:rPr>
-                        <a:t>Mardi 2 </a:t>
+                        <a:t>Vendredi</a:t>
                       </a:r>
                       <a:r>
-                        <a:rPr lang="en-CA" sz="1600" dirty="0" err="1">
+                        <a:rPr lang="en-CA" sz="1300" dirty="0">
                           <a:effectLst/>
                         </a:rPr>
-                        <a:t>mai</a:t>
+                        <a:t> 12 </a:t>
                       </a:r>
-                      <a:endParaRPr lang="en-US" sz="1600" b="1" dirty="0">
+                      <a:r>
+                        <a:rPr lang="en-CA" sz="1300" dirty="0" err="1">
+                          <a:effectLst/>
+                        </a:rPr>
+                        <a:t>janvier</a:t>
+                      </a:r>
+                      <a:endParaRPr lang="en-CA" sz="1300" b="1" dirty="0">
                         <a:effectLst/>
                         <a:latin typeface="Times New Roman" panose="02020603050405020304" pitchFamily="18" charset="0"/>
                         <a:ea typeface="Times New Roman" panose="02020603050405020304" pitchFamily="18" charset="0"/>
@@ -14012,16 +14251,16 @@
                       </a:endParaRPr>
                     </a:p>
                   </a:txBody>
-                  <a:tcPr marL="62089" marR="62089" marT="0" marB="0"/>
+                  <a:tcPr marL="18945" marR="18945" marT="0" marB="0"/>
                 </a:tc>
                 <a:tc>
                   <a:txBody>
                     <a:bodyPr/>
                     <a:lstStyle/>
                     <a:p>
-                      <a:pPr marL="0" indent="0" algn="l">
+                      <a:pPr marL="108000" indent="0" algn="l">
                         <a:spcBef>
-                          <a:spcPts val="0"/>
+                          <a:spcPts val="300"/>
                         </a:spcBef>
                         <a:spcAft>
                           <a:spcPts val="0"/>
@@ -14033,12 +14272,12 @@
                         </a:tabLst>
                       </a:pPr>
                       <a:r>
-                        <a:rPr lang="fr-CA" sz="1600">
+                        <a:rPr lang="fr-CA" sz="1300">
                           <a:effectLst/>
                         </a:rPr>
-                        <a:t>Mardi 16 mai à minuit</a:t>
+                        <a:t>Jeudi 25 janvier à minuit</a:t>
                       </a:r>
-                      <a:endParaRPr lang="en-US" sz="1600" b="1">
+                      <a:endParaRPr lang="en-CA" sz="1300" b="1">
                         <a:effectLst/>
                         <a:latin typeface="Times New Roman" panose="02020603050405020304" pitchFamily="18" charset="0"/>
                         <a:ea typeface="Times New Roman" panose="02020603050405020304" pitchFamily="18" charset="0"/>
@@ -14046,16 +14285,16 @@
                       </a:endParaRPr>
                     </a:p>
                   </a:txBody>
-                  <a:tcPr marL="62089" marR="62089" marT="0" marB="0"/>
+                  <a:tcPr marL="18945" marR="18945" marT="0" marB="0"/>
                 </a:tc>
                 <a:tc>
                   <a:txBody>
                     <a:bodyPr/>
                     <a:lstStyle/>
                     <a:p>
-                      <a:pPr marL="457200" indent="-228600" algn="ctr">
+                      <a:pPr marL="108000" indent="0" algn="ctr">
                         <a:spcBef>
-                          <a:spcPts val="600"/>
+                          <a:spcPts val="300"/>
                         </a:spcBef>
                         <a:spcAft>
                           <a:spcPts val="0"/>
@@ -14067,12 +14306,12 @@
                         </a:tabLst>
                       </a:pPr>
                       <a:r>
-                        <a:rPr lang="fr-CA" sz="1600">
+                        <a:rPr lang="fr-CA" sz="1300">
                           <a:effectLst/>
                         </a:rPr>
                         <a:t>8 %</a:t>
                       </a:r>
-                      <a:endParaRPr lang="en-US" sz="1600" b="1">
+                      <a:endParaRPr lang="en-CA" sz="1300" b="1">
                         <a:effectLst/>
                         <a:latin typeface="Times New Roman" panose="02020603050405020304" pitchFamily="18" charset="0"/>
                         <a:ea typeface="Times New Roman" panose="02020603050405020304" pitchFamily="18" charset="0"/>
@@ -14080,16 +14319,16 @@
                       </a:endParaRPr>
                     </a:p>
                   </a:txBody>
-                  <a:tcPr marL="62089" marR="62089" marT="0" marB="0"/>
+                  <a:tcPr marL="18945" marR="18945" marT="0" marB="0"/>
                 </a:tc>
                 <a:tc>
                   <a:txBody>
                     <a:bodyPr/>
                     <a:lstStyle/>
                     <a:p>
-                      <a:pPr marL="0" indent="0" algn="l">
+                      <a:pPr marL="108000" indent="0" algn="l">
                         <a:spcBef>
-                          <a:spcPts val="0"/>
+                          <a:spcPts val="300"/>
                         </a:spcBef>
                         <a:spcAft>
                           <a:spcPts val="0"/>
@@ -14101,12 +14340,12 @@
                         </a:tabLst>
                       </a:pPr>
                       <a:r>
-                        <a:rPr lang="en-CA" sz="1600" dirty="0">
+                        <a:rPr lang="en-CA" sz="1300">
                           <a:effectLst/>
                         </a:rPr>
                         <a:t>Perceptron</a:t>
                       </a:r>
-                      <a:endParaRPr lang="en-US" sz="1600" b="1" dirty="0">
+                      <a:endParaRPr lang="en-CA" sz="1300" b="1">
                         <a:effectLst/>
                         <a:latin typeface="Times New Roman" panose="02020603050405020304" pitchFamily="18" charset="0"/>
                         <a:ea typeface="Times New Roman" panose="02020603050405020304" pitchFamily="18" charset="0"/>
@@ -14114,23 +14353,23 @@
                       </a:endParaRPr>
                     </a:p>
                   </a:txBody>
-                  <a:tcPr marL="62089" marR="62089" marT="0" marB="0"/>
+                  <a:tcPr marL="18945" marR="18945" marT="0" marB="0"/>
                 </a:tc>
                 <a:extLst>
                   <a:ext uri="{0D108BD9-81ED-4DB2-BD59-A6C34878D82A}">
-                    <a16:rowId xmlns:a16="http://schemas.microsoft.com/office/drawing/2014/main" val="686342160"/>
+                    <a16:rowId xmlns:a16="http://schemas.microsoft.com/office/drawing/2014/main" val="2996746469"/>
                   </a:ext>
                 </a:extLst>
               </a:tr>
-              <a:tr h="453302">
+              <a:tr h="332968">
                 <a:tc>
                   <a:txBody>
                     <a:bodyPr/>
                     <a:lstStyle/>
                     <a:p>
-                      <a:pPr marL="457200" indent="-228600" algn="l">
+                      <a:pPr marL="108000" indent="0" algn="l">
                         <a:spcBef>
-                          <a:spcPts val="600"/>
+                          <a:spcPts val="300"/>
                         </a:spcBef>
                         <a:spcAft>
                           <a:spcPts val="0"/>
@@ -14142,12 +14381,12 @@
                         </a:tabLst>
                       </a:pPr>
                       <a:r>
-                        <a:rPr lang="fr-CA" sz="1600">
+                        <a:rPr lang="fr-CA" sz="1300">
                           <a:effectLst/>
                         </a:rPr>
-                        <a:t>TP 2                         </a:t>
+                        <a:t>TP 2                         </a:t>
                       </a:r>
-                      <a:endParaRPr lang="en-US" sz="1600" b="1">
+                      <a:endParaRPr lang="en-CA" sz="1300" b="1">
                         <a:effectLst/>
                         <a:latin typeface="Times New Roman" panose="02020603050405020304" pitchFamily="18" charset="0"/>
                         <a:ea typeface="Times New Roman" panose="02020603050405020304" pitchFamily="18" charset="0"/>
@@ -14155,16 +14394,16 @@
                       </a:endParaRPr>
                     </a:p>
                   </a:txBody>
-                  <a:tcPr marL="62089" marR="62089" marT="0" marB="0"/>
+                  <a:tcPr marL="18945" marR="18945" marT="0" marB="0"/>
                 </a:tc>
                 <a:tc>
                   <a:txBody>
                     <a:bodyPr/>
                     <a:lstStyle/>
                     <a:p>
-                      <a:pPr marL="0" indent="0" algn="l">
+                      <a:pPr marL="108000" indent="0" algn="l">
                         <a:spcBef>
-                          <a:spcPts val="0"/>
+                          <a:spcPts val="300"/>
                         </a:spcBef>
                         <a:spcAft>
                           <a:spcPts val="0"/>
@@ -14176,18 +14415,24 @@
                         </a:tabLst>
                       </a:pPr>
                       <a:r>
-                        <a:rPr lang="en-CA" sz="1600" dirty="0">
+                        <a:rPr lang="en-CA" sz="1300" dirty="0" err="1">
                           <a:effectLst/>
                         </a:rPr>
-                        <a:t>Mardi 16 </a:t>
+                        <a:t>Vendredi</a:t>
                       </a:r>
                       <a:r>
-                        <a:rPr lang="en-CA" sz="1600" dirty="0" err="1">
+                        <a:rPr lang="en-CA" sz="1300" dirty="0">
+                          <a:effectLst/>
+                        </a:rPr>
+                        <a:t> 26 </a:t>
+                      </a:r>
+                      <a:r>
+                        <a:rPr lang="en-CA" sz="1300" dirty="0" err="1">
                           <a:effectLst/>
                         </a:rPr>
                         <a:t>janvier</a:t>
                       </a:r>
-                      <a:endParaRPr lang="en-US" sz="1600" b="1" dirty="0">
+                      <a:endParaRPr lang="en-CA" sz="1300" b="1" dirty="0">
                         <a:effectLst/>
                         <a:latin typeface="Times New Roman" panose="02020603050405020304" pitchFamily="18" charset="0"/>
                         <a:ea typeface="Times New Roman" panose="02020603050405020304" pitchFamily="18" charset="0"/>
@@ -14195,16 +14440,16 @@
                       </a:endParaRPr>
                     </a:p>
                   </a:txBody>
-                  <a:tcPr marL="62089" marR="62089" marT="0" marB="0"/>
+                  <a:tcPr marL="18945" marR="18945" marT="0" marB="0"/>
                 </a:tc>
                 <a:tc>
                   <a:txBody>
                     <a:bodyPr/>
                     <a:lstStyle/>
                     <a:p>
-                      <a:pPr marL="0" indent="0" algn="l">
+                      <a:pPr marL="108000" indent="0" algn="l">
                         <a:spcBef>
-                          <a:spcPts val="0"/>
+                          <a:spcPts val="300"/>
                         </a:spcBef>
                         <a:spcAft>
                           <a:spcPts val="0"/>
@@ -14216,12 +14461,12 @@
                         </a:tabLst>
                       </a:pPr>
                       <a:r>
-                        <a:rPr lang="fr-CA" sz="1600">
+                        <a:rPr lang="fr-CA" sz="1300">
                           <a:effectLst/>
                         </a:rPr>
-                        <a:t>Matrdi 23 mai à minuit</a:t>
+                        <a:t>Jeudi 15 février à minuit</a:t>
                       </a:r>
-                      <a:endParaRPr lang="en-US" sz="1600" b="1">
+                      <a:endParaRPr lang="en-CA" sz="1300" b="1">
                         <a:effectLst/>
                         <a:latin typeface="Times New Roman" panose="02020603050405020304" pitchFamily="18" charset="0"/>
                         <a:ea typeface="Times New Roman" panose="02020603050405020304" pitchFamily="18" charset="0"/>
@@ -14229,16 +14474,16 @@
                       </a:endParaRPr>
                     </a:p>
                   </a:txBody>
-                  <a:tcPr marL="62089" marR="62089" marT="0" marB="0"/>
+                  <a:tcPr marL="18945" marR="18945" marT="0" marB="0"/>
                 </a:tc>
                 <a:tc>
                   <a:txBody>
                     <a:bodyPr/>
                     <a:lstStyle/>
                     <a:p>
-                      <a:pPr marL="457200" indent="-228600" algn="ctr">
+                      <a:pPr marL="108000" indent="0" algn="ctr">
                         <a:spcBef>
-                          <a:spcPts val="600"/>
+                          <a:spcPts val="300"/>
                         </a:spcBef>
                         <a:spcAft>
                           <a:spcPts val="0"/>
@@ -14250,12 +14495,12 @@
                         </a:tabLst>
                       </a:pPr>
                       <a:r>
-                        <a:rPr lang="fr-CA" sz="1600">
+                        <a:rPr lang="fr-CA" sz="1300">
                           <a:effectLst/>
                         </a:rPr>
                         <a:t>8 %</a:t>
                       </a:r>
-                      <a:endParaRPr lang="en-US" sz="1600" b="1">
+                      <a:endParaRPr lang="en-CA" sz="1300" b="1">
                         <a:effectLst/>
                         <a:latin typeface="Times New Roman" panose="02020603050405020304" pitchFamily="18" charset="0"/>
                         <a:ea typeface="Times New Roman" panose="02020603050405020304" pitchFamily="18" charset="0"/>
@@ -14263,16 +14508,16 @@
                       </a:endParaRPr>
                     </a:p>
                   </a:txBody>
-                  <a:tcPr marL="62089" marR="62089" marT="0" marB="0"/>
+                  <a:tcPr marL="18945" marR="18945" marT="0" marB="0"/>
                 </a:tc>
                 <a:tc>
                   <a:txBody>
                     <a:bodyPr/>
                     <a:lstStyle/>
                     <a:p>
-                      <a:pPr marL="0" indent="0" algn="l">
+                      <a:pPr marL="108000" indent="0" algn="l">
                         <a:spcBef>
-                          <a:spcPts val="0"/>
+                          <a:spcPts val="300"/>
                         </a:spcBef>
                         <a:spcAft>
                           <a:spcPts val="0"/>
@@ -14284,18 +14529,18 @@
                         </a:tabLst>
                       </a:pPr>
                       <a:r>
-                        <a:rPr lang="fr-CA" sz="1600" dirty="0">
+                        <a:rPr lang="fr-CA" sz="1300" dirty="0">
                           <a:effectLst/>
                         </a:rPr>
                         <a:t>Réseaux</a:t>
                       </a:r>
                       <a:r>
-                        <a:rPr lang="en-CA" sz="1600" dirty="0">
+                        <a:rPr lang="en-CA" sz="1300" dirty="0">
                           <a:effectLst/>
                         </a:rPr>
                         <a:t> de neurones</a:t>
                       </a:r>
-                      <a:endParaRPr lang="en-US" sz="1600" b="1" dirty="0">
+                      <a:endParaRPr lang="en-CA" sz="1300" b="1" dirty="0">
                         <a:effectLst/>
                         <a:latin typeface="Times New Roman" panose="02020603050405020304" pitchFamily="18" charset="0"/>
                         <a:ea typeface="Times New Roman" panose="02020603050405020304" pitchFamily="18" charset="0"/>
@@ -14303,23 +14548,23 @@
                       </a:endParaRPr>
                     </a:p>
                   </a:txBody>
-                  <a:tcPr marL="62089" marR="62089" marT="0" marB="0"/>
+                  <a:tcPr marL="18945" marR="18945" marT="0" marB="0"/>
                 </a:tc>
                 <a:extLst>
                   <a:ext uri="{0D108BD9-81ED-4DB2-BD59-A6C34878D82A}">
-                    <a16:rowId xmlns:a16="http://schemas.microsoft.com/office/drawing/2014/main" val="2698153683"/>
+                    <a16:rowId xmlns:a16="http://schemas.microsoft.com/office/drawing/2014/main" val="1549862295"/>
                   </a:ext>
                 </a:extLst>
               </a:tr>
-              <a:tr h="453302">
+              <a:tr h="388693">
                 <a:tc>
                   <a:txBody>
                     <a:bodyPr/>
                     <a:lstStyle/>
                     <a:p>
-                      <a:pPr marL="457200" indent="-228600" algn="l">
+                      <a:pPr marL="108000" indent="0" algn="l">
                         <a:spcBef>
-                          <a:spcPts val="600"/>
+                          <a:spcPts val="300"/>
                         </a:spcBef>
                         <a:spcAft>
                           <a:spcPts val="0"/>
@@ -14331,12 +14576,12 @@
                         </a:tabLst>
                       </a:pPr>
                       <a:r>
-                        <a:rPr lang="fr-CA" sz="1600">
+                        <a:rPr lang="fr-CA" sz="1300">
                           <a:effectLst/>
                         </a:rPr>
                         <a:t>Quiz 1</a:t>
                       </a:r>
-                      <a:endParaRPr lang="en-US" sz="1600" b="1">
+                      <a:endParaRPr lang="en-CA" sz="1300" b="1">
                         <a:effectLst/>
                         <a:latin typeface="Times New Roman" panose="02020603050405020304" pitchFamily="18" charset="0"/>
                         <a:ea typeface="Times New Roman" panose="02020603050405020304" pitchFamily="18" charset="0"/>
@@ -14344,16 +14589,16 @@
                       </a:endParaRPr>
                     </a:p>
                   </a:txBody>
-                  <a:tcPr marL="62089" marR="62089" marT="0" marB="0" anchor="ctr"/>
+                  <a:tcPr marL="18945" marR="18945" marT="0" marB="0" anchor="ctr"/>
                 </a:tc>
                 <a:tc>
                   <a:txBody>
                     <a:bodyPr/>
                     <a:lstStyle/>
                     <a:p>
-                      <a:pPr marL="0" indent="0" algn="l">
+                      <a:pPr marL="108000" indent="0" algn="l">
                         <a:spcBef>
-                          <a:spcPts val="0"/>
+                          <a:spcPts val="300"/>
                         </a:spcBef>
                         <a:spcAft>
                           <a:spcPts val="0"/>
@@ -14365,12 +14610,24 @@
                         </a:tabLst>
                       </a:pPr>
                       <a:r>
-                        <a:rPr lang="fr-CA" sz="1600" dirty="0">
+                        <a:rPr lang="fr-CA" sz="1300" dirty="0">
                           <a:effectLst/>
                         </a:rPr>
-                        <a:t>Mardi 23 mai</a:t>
+                        <a:t>Jeudi 1</a:t>
                       </a:r>
-                      <a:endParaRPr lang="en-US" sz="1600" b="1" dirty="0">
+                      <a:r>
+                        <a:rPr lang="fr-CA" sz="1300" baseline="30000" dirty="0">
+                          <a:effectLst/>
+                        </a:rPr>
+                        <a:t>er</a:t>
+                      </a:r>
+                      <a:r>
+                        <a:rPr lang="fr-CA" sz="1300" dirty="0">
+                          <a:effectLst/>
+                        </a:rPr>
+                        <a:t> février</a:t>
+                      </a:r>
+                      <a:endParaRPr lang="en-CA" sz="1300" b="1" dirty="0">
                         <a:effectLst/>
                         <a:latin typeface="Times New Roman" panose="02020603050405020304" pitchFamily="18" charset="0"/>
                         <a:ea typeface="Times New Roman" panose="02020603050405020304" pitchFamily="18" charset="0"/>
@@ -14378,16 +14635,16 @@
                       </a:endParaRPr>
                     </a:p>
                   </a:txBody>
-                  <a:tcPr marL="62089" marR="62089" marT="0" marB="0" anchor="ctr"/>
+                  <a:tcPr marL="18945" marR="18945" marT="0" marB="0" anchor="ctr"/>
                 </a:tc>
                 <a:tc>
                   <a:txBody>
                     <a:bodyPr/>
                     <a:lstStyle/>
                     <a:p>
-                      <a:pPr marL="0" indent="0" algn="l">
+                      <a:pPr marL="108000" indent="0" algn="l">
                         <a:spcBef>
-                          <a:spcPts val="0"/>
+                          <a:spcPts val="300"/>
                         </a:spcBef>
                         <a:spcAft>
                           <a:spcPts val="0"/>
@@ -14399,12 +14656,12 @@
                         </a:tabLst>
                       </a:pPr>
                       <a:r>
-                        <a:rPr lang="fr-CA" sz="1600">
+                        <a:rPr lang="fr-CA" sz="1300">
                           <a:effectLst/>
                         </a:rPr>
-                        <a:t>Mardi 6 juin à minuit</a:t>
+                        <a:t>Jeudi 15 février à minuit</a:t>
                       </a:r>
-                      <a:endParaRPr lang="en-US" sz="1600" b="1">
+                      <a:endParaRPr lang="en-CA" sz="1300" b="1">
                         <a:effectLst/>
                         <a:latin typeface="Times New Roman" panose="02020603050405020304" pitchFamily="18" charset="0"/>
                         <a:ea typeface="Times New Roman" panose="02020603050405020304" pitchFamily="18" charset="0"/>
@@ -14412,16 +14669,16 @@
                       </a:endParaRPr>
                     </a:p>
                   </a:txBody>
-                  <a:tcPr marL="62089" marR="62089" marT="0" marB="0" anchor="ctr"/>
+                  <a:tcPr marL="18945" marR="18945" marT="0" marB="0" anchor="ctr"/>
                 </a:tc>
                 <a:tc>
                   <a:txBody>
                     <a:bodyPr/>
                     <a:lstStyle/>
                     <a:p>
-                      <a:pPr marL="457200" indent="-228600" algn="ctr">
+                      <a:pPr marL="108000" indent="0" algn="ctr">
                         <a:spcBef>
-                          <a:spcPts val="600"/>
+                          <a:spcPts val="300"/>
                         </a:spcBef>
                         <a:spcAft>
                           <a:spcPts val="0"/>
@@ -14433,12 +14690,12 @@
                         </a:tabLst>
                       </a:pPr>
                       <a:r>
-                        <a:rPr lang="fr-CA" sz="1600">
+                        <a:rPr lang="fr-CA" sz="1300">
                           <a:effectLst/>
                         </a:rPr>
                         <a:t>3 %</a:t>
                       </a:r>
-                      <a:endParaRPr lang="en-US" sz="1600" b="1">
+                      <a:endParaRPr lang="en-CA" sz="1300" b="1">
                         <a:effectLst/>
                         <a:latin typeface="Times New Roman" panose="02020603050405020304" pitchFamily="18" charset="0"/>
                         <a:ea typeface="Times New Roman" panose="02020603050405020304" pitchFamily="18" charset="0"/>
@@ -14446,16 +14703,16 @@
                       </a:endParaRPr>
                     </a:p>
                   </a:txBody>
-                  <a:tcPr marL="62089" marR="62089" marT="0" marB="0" anchor="ctr"/>
+                  <a:tcPr marL="18945" marR="18945" marT="0" marB="0" anchor="ctr"/>
                 </a:tc>
                 <a:tc>
                   <a:txBody>
                     <a:bodyPr/>
                     <a:lstStyle/>
                     <a:p>
-                      <a:pPr marL="0" indent="0" algn="l">
+                      <a:pPr marL="108000" indent="0" algn="l">
                         <a:spcBef>
-                          <a:spcPts val="0"/>
+                          <a:spcPts val="300"/>
                         </a:spcBef>
                         <a:spcAft>
                           <a:spcPts val="0"/>
@@ -14467,12 +14724,12 @@
                         </a:tabLst>
                       </a:pPr>
                       <a:r>
-                        <a:rPr lang="fr-CA" sz="1600" dirty="0">
+                        <a:rPr lang="fr-CA" sz="1300">
                           <a:effectLst/>
                         </a:rPr>
                         <a:t>Arbres de décision</a:t>
                       </a:r>
-                      <a:endParaRPr lang="en-US" sz="1600" b="1" dirty="0">
+                      <a:endParaRPr lang="en-CA" sz="1300" b="1">
                         <a:effectLst/>
                         <a:latin typeface="Times New Roman" panose="02020603050405020304" pitchFamily="18" charset="0"/>
                         <a:ea typeface="Times New Roman" panose="02020603050405020304" pitchFamily="18" charset="0"/>
@@ -14480,23 +14737,23 @@
                       </a:endParaRPr>
                     </a:p>
                   </a:txBody>
-                  <a:tcPr marL="62089" marR="62089" marT="0" marB="0" anchor="ctr"/>
+                  <a:tcPr marL="18945" marR="18945" marT="0" marB="0" anchor="ctr"/>
                 </a:tc>
                 <a:extLst>
                   <a:ext uri="{0D108BD9-81ED-4DB2-BD59-A6C34878D82A}">
-                    <a16:rowId xmlns:a16="http://schemas.microsoft.com/office/drawing/2014/main" val="3925988629"/>
+                    <a16:rowId xmlns:a16="http://schemas.microsoft.com/office/drawing/2014/main" val="1400690178"/>
                   </a:ext>
                 </a:extLst>
               </a:tr>
-              <a:tr h="472321">
+              <a:tr h="309637">
                 <a:tc>
                   <a:txBody>
                     <a:bodyPr/>
                     <a:lstStyle/>
                     <a:p>
-                      <a:pPr marL="457200" indent="-228600" algn="l">
+                      <a:pPr marL="108000" indent="0" algn="l">
                         <a:spcBef>
-                          <a:spcPts val="600"/>
+                          <a:spcPts val="300"/>
                         </a:spcBef>
                         <a:spcAft>
                           <a:spcPts val="0"/>
@@ -14508,12 +14765,12 @@
                         </a:tabLst>
                       </a:pPr>
                       <a:r>
-                        <a:rPr lang="fr-CA" sz="1600">
+                        <a:rPr lang="fr-CA" sz="1300">
                           <a:effectLst/>
                         </a:rPr>
                         <a:t>TP 3</a:t>
                       </a:r>
-                      <a:endParaRPr lang="en-US" sz="1600" b="1">
+                      <a:endParaRPr lang="en-CA" sz="1300" b="1">
                         <a:effectLst/>
                         <a:latin typeface="Times New Roman" panose="02020603050405020304" pitchFamily="18" charset="0"/>
                         <a:ea typeface="Times New Roman" panose="02020603050405020304" pitchFamily="18" charset="0"/>
@@ -14521,16 +14778,16 @@
                       </a:endParaRPr>
                     </a:p>
                   </a:txBody>
-                  <a:tcPr marL="62089" marR="62089" marT="0" marB="0"/>
+                  <a:tcPr marL="18945" marR="18945" marT="0" marB="0"/>
                 </a:tc>
                 <a:tc>
                   <a:txBody>
                     <a:bodyPr/>
                     <a:lstStyle/>
                     <a:p>
-                      <a:pPr marL="0" indent="0" algn="l">
+                      <a:pPr marL="108000" indent="0" algn="l">
                         <a:spcBef>
-                          <a:spcPts val="0"/>
+                          <a:spcPts val="300"/>
                         </a:spcBef>
                         <a:spcAft>
                           <a:spcPts val="0"/>
@@ -14542,12 +14799,12 @@
                         </a:tabLst>
                       </a:pPr>
                       <a:r>
-                        <a:rPr lang="fr-CA" sz="1600">
+                        <a:rPr lang="fr-CA" sz="1300">
                           <a:effectLst/>
                         </a:rPr>
-                        <a:t>Lundi 6 juin</a:t>
+                        <a:t>Jeudi 15 février</a:t>
                       </a:r>
-                      <a:endParaRPr lang="en-US" sz="1600" b="1">
+                      <a:endParaRPr lang="en-CA" sz="1300" b="1">
                         <a:effectLst/>
                         <a:latin typeface="Times New Roman" panose="02020603050405020304" pitchFamily="18" charset="0"/>
                         <a:ea typeface="Times New Roman" panose="02020603050405020304" pitchFamily="18" charset="0"/>
@@ -14555,16 +14812,16 @@
                       </a:endParaRPr>
                     </a:p>
                   </a:txBody>
-                  <a:tcPr marL="62089" marR="62089" marT="0" marB="0"/>
+                  <a:tcPr marL="18945" marR="18945" marT="0" marB="0"/>
                 </a:tc>
                 <a:tc>
                   <a:txBody>
                     <a:bodyPr/>
                     <a:lstStyle/>
                     <a:p>
-                      <a:pPr marL="0" indent="0" algn="l">
+                      <a:pPr marL="108000" indent="0" algn="l">
                         <a:spcBef>
-                          <a:spcPts val="0"/>
+                          <a:spcPts val="300"/>
                         </a:spcBef>
                         <a:spcAft>
                           <a:spcPts val="0"/>
@@ -14576,12 +14833,12 @@
                         </a:tabLst>
                       </a:pPr>
                       <a:r>
-                        <a:rPr lang="fr-CA" sz="1600">
+                        <a:rPr lang="fr-CA" sz="1300" dirty="0">
                           <a:effectLst/>
                         </a:rPr>
-                        <a:t>Mardi 4 juillet à minuit</a:t>
+                        <a:t>Jeudi 14 mars à minuit</a:t>
                       </a:r>
-                      <a:endParaRPr lang="en-US" sz="1600" b="1">
+                      <a:endParaRPr lang="en-CA" sz="1300" b="1" dirty="0">
                         <a:effectLst/>
                         <a:latin typeface="Times New Roman" panose="02020603050405020304" pitchFamily="18" charset="0"/>
                         <a:ea typeface="Times New Roman" panose="02020603050405020304" pitchFamily="18" charset="0"/>
@@ -14589,16 +14846,16 @@
                       </a:endParaRPr>
                     </a:p>
                   </a:txBody>
-                  <a:tcPr marL="62089" marR="62089" marT="0" marB="0"/>
+                  <a:tcPr marL="18945" marR="18945" marT="0" marB="0"/>
                 </a:tc>
                 <a:tc>
                   <a:txBody>
                     <a:bodyPr/>
                     <a:lstStyle/>
                     <a:p>
-                      <a:pPr marL="457200" indent="-228600" algn="ctr">
+                      <a:pPr marL="108000" indent="0" algn="ctr">
                         <a:spcBef>
-                          <a:spcPts val="600"/>
+                          <a:spcPts val="300"/>
                         </a:spcBef>
                         <a:spcAft>
                           <a:spcPts val="0"/>
@@ -14610,12 +14867,12 @@
                         </a:tabLst>
                       </a:pPr>
                       <a:r>
-                        <a:rPr lang="fr-CA" sz="1600">
+                        <a:rPr lang="fr-CA" sz="1300">
                           <a:effectLst/>
                         </a:rPr>
                         <a:t>8 %</a:t>
                       </a:r>
-                      <a:endParaRPr lang="en-US" sz="1600" b="1">
+                      <a:endParaRPr lang="en-CA" sz="1300" b="1">
                         <a:effectLst/>
                         <a:latin typeface="Times New Roman" panose="02020603050405020304" pitchFamily="18" charset="0"/>
                         <a:ea typeface="Times New Roman" panose="02020603050405020304" pitchFamily="18" charset="0"/>
@@ -14623,16 +14880,16 @@
                       </a:endParaRPr>
                     </a:p>
                   </a:txBody>
-                  <a:tcPr marL="62089" marR="62089" marT="0" marB="0"/>
+                  <a:tcPr marL="18945" marR="18945" marT="0" marB="0"/>
                 </a:tc>
                 <a:tc>
                   <a:txBody>
                     <a:bodyPr/>
                     <a:lstStyle/>
                     <a:p>
-                      <a:pPr marL="0" indent="0" algn="l">
+                      <a:pPr marL="108000" indent="0" algn="l">
                         <a:spcBef>
-                          <a:spcPts val="0"/>
+                          <a:spcPts val="300"/>
                         </a:spcBef>
                         <a:spcAft>
                           <a:spcPts val="0"/>
@@ -14644,12 +14901,12 @@
                         </a:tabLst>
                       </a:pPr>
                       <a:r>
-                        <a:rPr lang="fr-CA" sz="1600" dirty="0">
+                        <a:rPr lang="fr-CA" sz="1300">
                           <a:effectLst/>
                         </a:rPr>
                         <a:t>Inférences probabilistes</a:t>
                       </a:r>
-                      <a:endParaRPr lang="en-US" sz="1600" b="1" dirty="0">
+                      <a:endParaRPr lang="en-CA" sz="1300" b="1">
                         <a:effectLst/>
                         <a:latin typeface="Times New Roman" panose="02020603050405020304" pitchFamily="18" charset="0"/>
                         <a:ea typeface="Times New Roman" panose="02020603050405020304" pitchFamily="18" charset="0"/>
@@ -14657,23 +14914,23 @@
                       </a:endParaRPr>
                     </a:p>
                   </a:txBody>
-                  <a:tcPr marL="62089" marR="62089" marT="0" marB="0"/>
+                  <a:tcPr marL="18945" marR="18945" marT="0" marB="0"/>
                 </a:tc>
                 <a:extLst>
                   <a:ext uri="{0D108BD9-81ED-4DB2-BD59-A6C34878D82A}">
-                    <a16:rowId xmlns:a16="http://schemas.microsoft.com/office/drawing/2014/main" val="265910386"/>
+                    <a16:rowId xmlns:a16="http://schemas.microsoft.com/office/drawing/2014/main" val="1304414833"/>
                   </a:ext>
                 </a:extLst>
               </a:tr>
-              <a:tr h="486737">
+              <a:tr h="349165">
                 <a:tc>
                   <a:txBody>
                     <a:bodyPr/>
                     <a:lstStyle/>
                     <a:p>
-                      <a:pPr marL="457200" indent="-228600" algn="l">
+                      <a:pPr marL="108000" indent="0" algn="l">
                         <a:spcBef>
-                          <a:spcPts val="600"/>
+                          <a:spcPts val="300"/>
                         </a:spcBef>
                         <a:spcAft>
                           <a:spcPts val="0"/>
@@ -14685,12 +14942,12 @@
                         </a:tabLst>
                       </a:pPr>
                       <a:r>
-                        <a:rPr lang="fr-CA" sz="1600">
+                        <a:rPr lang="fr-CA" sz="1300">
                           <a:effectLst/>
                         </a:rPr>
                         <a:t>TP 4</a:t>
                       </a:r>
-                      <a:endParaRPr lang="en-US" sz="1600" b="1">
+                      <a:endParaRPr lang="en-CA" sz="1300" b="1">
                         <a:effectLst/>
                         <a:latin typeface="Times New Roman" panose="02020603050405020304" pitchFamily="18" charset="0"/>
                         <a:ea typeface="Times New Roman" panose="02020603050405020304" pitchFamily="18" charset="0"/>
@@ -14698,16 +14955,16 @@
                       </a:endParaRPr>
                     </a:p>
                   </a:txBody>
-                  <a:tcPr marL="62089" marR="62089" marT="0" marB="0"/>
+                  <a:tcPr marL="18945" marR="18945" marT="0" marB="0"/>
                 </a:tc>
                 <a:tc>
                   <a:txBody>
                     <a:bodyPr/>
                     <a:lstStyle/>
                     <a:p>
-                      <a:pPr marL="0" indent="0" algn="l">
+                      <a:pPr marL="108000" indent="0" algn="l">
                         <a:spcBef>
-                          <a:spcPts val="0"/>
+                          <a:spcPts val="300"/>
                         </a:spcBef>
                         <a:spcAft>
                           <a:spcPts val="0"/>
@@ -14719,12 +14976,12 @@
                         </a:tabLst>
                       </a:pPr>
                       <a:r>
-                        <a:rPr lang="fr-CA" sz="1600">
+                        <a:rPr lang="fr-CA" sz="1300">
                           <a:effectLst/>
                         </a:rPr>
-                        <a:t>Lundi 3 juillet</a:t>
+                        <a:t>Vendredi 15 mars</a:t>
                       </a:r>
-                      <a:endParaRPr lang="en-US" sz="1600" b="1">
+                      <a:endParaRPr lang="en-CA" sz="1300" b="1">
                         <a:effectLst/>
                         <a:latin typeface="Times New Roman" panose="02020603050405020304" pitchFamily="18" charset="0"/>
                         <a:ea typeface="Times New Roman" panose="02020603050405020304" pitchFamily="18" charset="0"/>
@@ -14732,16 +14989,16 @@
                       </a:endParaRPr>
                     </a:p>
                   </a:txBody>
-                  <a:tcPr marL="62089" marR="62089" marT="0" marB="0"/>
+                  <a:tcPr marL="18945" marR="18945" marT="0" marB="0"/>
                 </a:tc>
                 <a:tc>
                   <a:txBody>
                     <a:bodyPr/>
                     <a:lstStyle/>
                     <a:p>
-                      <a:pPr marL="0" indent="0" algn="l">
+                      <a:pPr marL="108000" indent="0" algn="l">
                         <a:spcBef>
-                          <a:spcPts val="0"/>
+                          <a:spcPts val="300"/>
                         </a:spcBef>
                         <a:spcAft>
                           <a:spcPts val="0"/>
@@ -14753,12 +15010,12 @@
                         </a:tabLst>
                       </a:pPr>
                       <a:r>
-                        <a:rPr lang="fr-CA" sz="1600" dirty="0">
+                        <a:rPr lang="fr-CA" sz="1300" dirty="0">
                           <a:effectLst/>
                         </a:rPr>
-                        <a:t>Mardi 17 juillet à minuit</a:t>
+                        <a:t>Jeudi 4 avril à minuit.</a:t>
                       </a:r>
-                      <a:endParaRPr lang="en-US" sz="1600" b="1" dirty="0">
+                      <a:endParaRPr lang="en-CA" sz="1300" b="1" dirty="0">
                         <a:effectLst/>
                         <a:latin typeface="Times New Roman" panose="02020603050405020304" pitchFamily="18" charset="0"/>
                         <a:ea typeface="Times New Roman" panose="02020603050405020304" pitchFamily="18" charset="0"/>
@@ -14766,16 +15023,16 @@
                       </a:endParaRPr>
                     </a:p>
                   </a:txBody>
-                  <a:tcPr marL="62089" marR="62089" marT="0" marB="0"/>
+                  <a:tcPr marL="18945" marR="18945" marT="0" marB="0"/>
                 </a:tc>
                 <a:tc>
                   <a:txBody>
                     <a:bodyPr/>
                     <a:lstStyle/>
                     <a:p>
-                      <a:pPr marL="457200" indent="-228600" algn="ctr">
+                      <a:pPr marL="108000" indent="0" algn="ctr">
                         <a:spcBef>
-                          <a:spcPts val="600"/>
+                          <a:spcPts val="300"/>
                         </a:spcBef>
                         <a:spcAft>
                           <a:spcPts val="0"/>
@@ -14787,12 +15044,12 @@
                         </a:tabLst>
                       </a:pPr>
                       <a:r>
-                        <a:rPr lang="fr-CA" sz="1600">
+                        <a:rPr lang="fr-CA" sz="1300">
                           <a:effectLst/>
                         </a:rPr>
                         <a:t>8 %</a:t>
                       </a:r>
-                      <a:endParaRPr lang="en-US" sz="1600" b="1">
+                      <a:endParaRPr lang="en-CA" sz="1300" b="1">
                         <a:effectLst/>
                         <a:latin typeface="Times New Roman" panose="02020603050405020304" pitchFamily="18" charset="0"/>
                         <a:ea typeface="Times New Roman" panose="02020603050405020304" pitchFamily="18" charset="0"/>
@@ -14800,16 +15057,16 @@
                       </a:endParaRPr>
                     </a:p>
                   </a:txBody>
-                  <a:tcPr marL="62089" marR="62089" marT="0" marB="0"/>
+                  <a:tcPr marL="18945" marR="18945" marT="0" marB="0"/>
                 </a:tc>
                 <a:tc>
                   <a:txBody>
                     <a:bodyPr/>
                     <a:lstStyle/>
                     <a:p>
-                      <a:pPr marL="0" indent="0" algn="l">
+                      <a:pPr marL="108000" indent="0" algn="l">
                         <a:spcBef>
-                          <a:spcPts val="0"/>
+                          <a:spcPts val="300"/>
                         </a:spcBef>
                         <a:spcAft>
                           <a:spcPts val="0"/>
@@ -14821,12 +15078,12 @@
                         </a:tabLst>
                       </a:pPr>
                       <a:r>
-                        <a:rPr lang="fr-CA" sz="1600" dirty="0">
+                        <a:rPr lang="fr-CA" sz="1300">
                           <a:effectLst/>
                         </a:rPr>
                         <a:t>Apprentissage par renforcement </a:t>
                       </a:r>
-                      <a:endParaRPr lang="en-US" sz="1600" b="1" dirty="0">
+                      <a:endParaRPr lang="en-CA" sz="1300" b="1">
                         <a:effectLst/>
                         <a:latin typeface="Times New Roman" panose="02020603050405020304" pitchFamily="18" charset="0"/>
                         <a:ea typeface="Times New Roman" panose="02020603050405020304" pitchFamily="18" charset="0"/>
@@ -14834,23 +15091,23 @@
                       </a:endParaRPr>
                     </a:p>
                   </a:txBody>
-                  <a:tcPr marL="62089" marR="62089" marT="0" marB="0"/>
+                  <a:tcPr marL="18945" marR="18945" marT="0" marB="0"/>
                 </a:tc>
                 <a:extLst>
                   <a:ext uri="{0D108BD9-81ED-4DB2-BD59-A6C34878D82A}">
-                    <a16:rowId xmlns:a16="http://schemas.microsoft.com/office/drawing/2014/main" val="3115659761"/>
+                    <a16:rowId xmlns:a16="http://schemas.microsoft.com/office/drawing/2014/main" val="3988789638"/>
                   </a:ext>
                 </a:extLst>
               </a:tr>
-              <a:tr h="486737">
+              <a:tr h="329402">
                 <a:tc>
                   <a:txBody>
                     <a:bodyPr/>
                     <a:lstStyle/>
                     <a:p>
-                      <a:pPr marL="457200" indent="-228600" algn="l">
+                      <a:pPr marL="108000" indent="0" algn="l">
                         <a:spcBef>
-                          <a:spcPts val="600"/>
+                          <a:spcPts val="300"/>
                         </a:spcBef>
                         <a:spcAft>
                           <a:spcPts val="0"/>
@@ -14862,12 +15119,12 @@
                         </a:tabLst>
                       </a:pPr>
                       <a:r>
-                        <a:rPr lang="fr-CA" sz="1600">
+                        <a:rPr lang="fr-CA" sz="1300">
                           <a:effectLst/>
                         </a:rPr>
-                        <a:t>Quiz 2</a:t>
+                        <a:t>TP 5</a:t>
                       </a:r>
-                      <a:endParaRPr lang="en-US" sz="1600" b="1">
+                      <a:endParaRPr lang="en-CA" sz="1300" b="1">
                         <a:effectLst/>
                         <a:latin typeface="Times New Roman" panose="02020603050405020304" pitchFamily="18" charset="0"/>
                         <a:ea typeface="Times New Roman" panose="02020603050405020304" pitchFamily="18" charset="0"/>
@@ -14875,16 +15132,16 @@
                       </a:endParaRPr>
                     </a:p>
                   </a:txBody>
-                  <a:tcPr marL="62089" marR="62089" marT="0" marB="0"/>
+                  <a:tcPr marL="18945" marR="18945" marT="0" marB="0"/>
                 </a:tc>
                 <a:tc>
                   <a:txBody>
                     <a:bodyPr/>
                     <a:lstStyle/>
                     <a:p>
-                      <a:pPr marL="0" indent="0" algn="l">
+                      <a:pPr marL="108000" indent="0" algn="l">
                         <a:spcBef>
-                          <a:spcPts val="0"/>
+                          <a:spcPts val="300"/>
                         </a:spcBef>
                         <a:spcAft>
                           <a:spcPts val="0"/>
@@ -14896,12 +15153,12 @@
                         </a:tabLst>
                       </a:pPr>
                       <a:r>
-                        <a:rPr lang="fr-CA" sz="1600">
+                        <a:rPr lang="fr-CA" sz="1300">
                           <a:effectLst/>
                         </a:rPr>
-                        <a:t>Mardi 18 juillet</a:t>
+                        <a:t>Vendredi 22 mars</a:t>
                       </a:r>
-                      <a:endParaRPr lang="en-US" sz="1600" b="1">
+                      <a:endParaRPr lang="en-CA" sz="1300" b="1">
                         <a:effectLst/>
                         <a:latin typeface="Times New Roman" panose="02020603050405020304" pitchFamily="18" charset="0"/>
                         <a:ea typeface="Times New Roman" panose="02020603050405020304" pitchFamily="18" charset="0"/>
@@ -14909,16 +15166,16 @@
                       </a:endParaRPr>
                     </a:p>
                   </a:txBody>
-                  <a:tcPr marL="62089" marR="62089" marT="0" marB="0"/>
+                  <a:tcPr marL="18945" marR="18945" marT="0" marB="0"/>
                 </a:tc>
                 <a:tc>
                   <a:txBody>
                     <a:bodyPr/>
                     <a:lstStyle/>
                     <a:p>
-                      <a:pPr marL="0" indent="0" algn="l">
+                      <a:pPr marL="108000" indent="0" algn="l">
                         <a:spcBef>
-                          <a:spcPts val="0"/>
+                          <a:spcPts val="300"/>
                         </a:spcBef>
                         <a:spcAft>
                           <a:spcPts val="0"/>
@@ -14930,12 +15187,12 @@
                         </a:tabLst>
                       </a:pPr>
                       <a:r>
-                        <a:rPr lang="fr-CA" sz="1600" dirty="0">
+                        <a:rPr lang="fr-CA" sz="1300" dirty="0">
                           <a:effectLst/>
                         </a:rPr>
-                        <a:t>Mardi 24 juillet à minuit</a:t>
+                        <a:t>Lundi 15 avril à minuit</a:t>
                       </a:r>
-                      <a:endParaRPr lang="en-US" sz="1600" b="1" dirty="0">
+                      <a:endParaRPr lang="en-CA" sz="1300" b="1" dirty="0">
                         <a:effectLst/>
                         <a:latin typeface="Times New Roman" panose="02020603050405020304" pitchFamily="18" charset="0"/>
                         <a:ea typeface="Times New Roman" panose="02020603050405020304" pitchFamily="18" charset="0"/>
@@ -14943,16 +15200,16 @@
                       </a:endParaRPr>
                     </a:p>
                   </a:txBody>
-                  <a:tcPr marL="62089" marR="62089" marT="0" marB="0"/>
+                  <a:tcPr marL="18945" marR="18945" marT="0" marB="0"/>
                 </a:tc>
                 <a:tc>
                   <a:txBody>
                     <a:bodyPr/>
                     <a:lstStyle/>
                     <a:p>
-                      <a:pPr marL="457200" indent="-228600" algn="ctr">
+                      <a:pPr marL="108000" indent="0" algn="ctr">
                         <a:spcBef>
-                          <a:spcPts val="600"/>
+                          <a:spcPts val="300"/>
                         </a:spcBef>
                         <a:spcAft>
                           <a:spcPts val="0"/>
@@ -14964,12 +15221,12 @@
                         </a:tabLst>
                       </a:pPr>
                       <a:r>
-                        <a:rPr lang="fr-CA" sz="1600">
+                        <a:rPr lang="fr-CA" sz="1300" dirty="0">
                           <a:effectLst/>
                         </a:rPr>
-                        <a:t>3 %</a:t>
+                        <a:t>8 %</a:t>
                       </a:r>
-                      <a:endParaRPr lang="en-US" sz="1600" b="1">
+                      <a:endParaRPr lang="en-CA" sz="1300" b="1" dirty="0">
                         <a:effectLst/>
                         <a:latin typeface="Times New Roman" panose="02020603050405020304" pitchFamily="18" charset="0"/>
                         <a:ea typeface="Times New Roman" panose="02020603050405020304" pitchFamily="18" charset="0"/>
@@ -14977,16 +15234,16 @@
                       </a:endParaRPr>
                     </a:p>
                   </a:txBody>
-                  <a:tcPr marL="62089" marR="62089" marT="0" marB="0"/>
+                  <a:tcPr marL="18945" marR="18945" marT="0" marB="0"/>
                 </a:tc>
                 <a:tc>
                   <a:txBody>
                     <a:bodyPr/>
                     <a:lstStyle/>
                     <a:p>
-                      <a:pPr marL="0" indent="0" algn="l">
+                      <a:pPr marL="108000" indent="0" algn="l">
                         <a:spcBef>
-                          <a:spcPts val="0"/>
+                          <a:spcPts val="300"/>
                         </a:spcBef>
                         <a:spcAft>
                           <a:spcPts val="0"/>
@@ -14998,12 +15255,12 @@
                         </a:tabLst>
                       </a:pPr>
                       <a:r>
-                        <a:rPr lang="fr-CA" sz="1600" dirty="0">
+                        <a:rPr lang="fr-CA" sz="1300">
                           <a:effectLst/>
                         </a:rPr>
-                        <a:t>Recherche locale et optimisation</a:t>
+                        <a:t>Théorie des jeux</a:t>
                       </a:r>
-                      <a:endParaRPr lang="en-US" sz="1600" b="1" dirty="0">
+                      <a:endParaRPr lang="en-CA" sz="1300" b="1">
                         <a:effectLst/>
                         <a:latin typeface="Times New Roman" panose="02020603050405020304" pitchFamily="18" charset="0"/>
                         <a:ea typeface="Times New Roman" panose="02020603050405020304" pitchFamily="18" charset="0"/>
@@ -15011,23 +15268,23 @@
                       </a:endParaRPr>
                     </a:p>
                   </a:txBody>
-                  <a:tcPr marL="62089" marR="62089" marT="0" marB="0"/>
+                  <a:tcPr marL="18945" marR="18945" marT="0" marB="0"/>
                 </a:tc>
                 <a:extLst>
                   <a:ext uri="{0D108BD9-81ED-4DB2-BD59-A6C34878D82A}">
-                    <a16:rowId xmlns:a16="http://schemas.microsoft.com/office/drawing/2014/main" val="2870474456"/>
+                    <a16:rowId xmlns:a16="http://schemas.microsoft.com/office/drawing/2014/main" val="2171899703"/>
                   </a:ext>
                 </a:extLst>
               </a:tr>
-              <a:tr h="453302">
+              <a:tr h="349165">
                 <a:tc>
                   <a:txBody>
                     <a:bodyPr/>
                     <a:lstStyle/>
                     <a:p>
-                      <a:pPr marL="457200" indent="-228600" algn="l">
+                      <a:pPr marL="108000" indent="0" algn="l">
                         <a:spcBef>
-                          <a:spcPts val="600"/>
+                          <a:spcPts val="300"/>
                         </a:spcBef>
                         <a:spcAft>
                           <a:spcPts val="0"/>
@@ -15039,12 +15296,12 @@
                         </a:tabLst>
                       </a:pPr>
                       <a:r>
-                        <a:rPr lang="fr-CA" sz="1600">
+                        <a:rPr lang="fr-CA" sz="1300">
                           <a:effectLst/>
                         </a:rPr>
-                        <a:t>TP 5</a:t>
+                        <a:t>Quiz 2</a:t>
                       </a:r>
-                      <a:endParaRPr lang="en-US" sz="1600" b="1">
+                      <a:endParaRPr lang="en-CA" sz="1300" b="1">
                         <a:effectLst/>
                         <a:latin typeface="Times New Roman" panose="02020603050405020304" pitchFamily="18" charset="0"/>
                         <a:ea typeface="Times New Roman" panose="02020603050405020304" pitchFamily="18" charset="0"/>
@@ -15052,16 +15309,16 @@
                       </a:endParaRPr>
                     </a:p>
                   </a:txBody>
-                  <a:tcPr marL="62089" marR="62089" marT="0" marB="0"/>
+                  <a:tcPr marL="18945" marR="18945" marT="0" marB="0"/>
                 </a:tc>
                 <a:tc>
                   <a:txBody>
                     <a:bodyPr/>
                     <a:lstStyle/>
                     <a:p>
-                      <a:pPr marL="0" indent="0" algn="l">
+                      <a:pPr marL="108000" indent="0" algn="l">
                         <a:spcBef>
-                          <a:spcPts val="0"/>
+                          <a:spcPts val="300"/>
                         </a:spcBef>
                         <a:spcAft>
                           <a:spcPts val="0"/>
@@ -15073,12 +15330,12 @@
                         </a:tabLst>
                       </a:pPr>
                       <a:r>
-                        <a:rPr lang="fr-CA" sz="1600">
+                        <a:rPr lang="fr-CA" sz="1300">
                           <a:effectLst/>
                         </a:rPr>
-                        <a:t>Mardi 17 juillet</a:t>
+                        <a:t>Jeudi 4 avril</a:t>
                       </a:r>
-                      <a:endParaRPr lang="en-US" sz="1600" b="1">
+                      <a:endParaRPr lang="en-CA" sz="1300" b="1">
                         <a:effectLst/>
                         <a:latin typeface="Times New Roman" panose="02020603050405020304" pitchFamily="18" charset="0"/>
                         <a:ea typeface="Times New Roman" panose="02020603050405020304" pitchFamily="18" charset="0"/>
@@ -15086,16 +15343,16 @@
                       </a:endParaRPr>
                     </a:p>
                   </a:txBody>
-                  <a:tcPr marL="62089" marR="62089" marT="0" marB="0"/>
+                  <a:tcPr marL="18945" marR="18945" marT="0" marB="0"/>
                 </a:tc>
                 <a:tc>
                   <a:txBody>
                     <a:bodyPr/>
                     <a:lstStyle/>
                     <a:p>
-                      <a:pPr marL="0" indent="0" algn="l">
+                      <a:pPr marL="108000" indent="0" algn="l">
                         <a:spcBef>
-                          <a:spcPts val="0"/>
+                          <a:spcPts val="300"/>
                         </a:spcBef>
                         <a:spcAft>
                           <a:spcPts val="0"/>
@@ -15107,12 +15364,12 @@
                         </a:tabLst>
                       </a:pPr>
                       <a:r>
-                        <a:rPr lang="fr-CA" sz="1600" dirty="0">
+                        <a:rPr lang="fr-CA" sz="1300">
                           <a:effectLst/>
                         </a:rPr>
-                        <a:t>Lundi 7 août à minuit</a:t>
+                        <a:t>Jeudi 11 avril à minuit</a:t>
                       </a:r>
-                      <a:endParaRPr lang="en-US" sz="1600" b="1" dirty="0">
+                      <a:endParaRPr lang="en-CA" sz="1300" b="1">
                         <a:effectLst/>
                         <a:latin typeface="Times New Roman" panose="02020603050405020304" pitchFamily="18" charset="0"/>
                         <a:ea typeface="Times New Roman" panose="02020603050405020304" pitchFamily="18" charset="0"/>
@@ -15120,16 +15377,16 @@
                       </a:endParaRPr>
                     </a:p>
                   </a:txBody>
-                  <a:tcPr marL="62089" marR="62089" marT="0" marB="0"/>
+                  <a:tcPr marL="18945" marR="18945" marT="0" marB="0"/>
                 </a:tc>
                 <a:tc>
                   <a:txBody>
                     <a:bodyPr/>
                     <a:lstStyle/>
                     <a:p>
-                      <a:pPr marL="457200" indent="-228600" algn="ctr">
+                      <a:pPr marL="108000" indent="0" algn="ctr">
                         <a:spcBef>
-                          <a:spcPts val="600"/>
+                          <a:spcPts val="300"/>
                         </a:spcBef>
                         <a:spcAft>
                           <a:spcPts val="0"/>
@@ -15141,12 +15398,12 @@
                         </a:tabLst>
                       </a:pPr>
                       <a:r>
-                        <a:rPr lang="fr-CA" sz="1600">
+                        <a:rPr lang="fr-CA" sz="1300" dirty="0">
                           <a:effectLst/>
                         </a:rPr>
-                        <a:t>8 %</a:t>
+                        <a:t>3 %</a:t>
                       </a:r>
-                      <a:endParaRPr lang="en-US" sz="1600" b="1">
+                      <a:endParaRPr lang="en-CA" sz="1300" b="1" dirty="0">
                         <a:effectLst/>
                         <a:latin typeface="Times New Roman" panose="02020603050405020304" pitchFamily="18" charset="0"/>
                         <a:ea typeface="Times New Roman" panose="02020603050405020304" pitchFamily="18" charset="0"/>
@@ -15154,16 +15411,16 @@
                       </a:endParaRPr>
                     </a:p>
                   </a:txBody>
-                  <a:tcPr marL="62089" marR="62089" marT="0" marB="0"/>
+                  <a:tcPr marL="18945" marR="18945" marT="0" marB="0"/>
                 </a:tc>
                 <a:tc>
                   <a:txBody>
                     <a:bodyPr/>
                     <a:lstStyle/>
                     <a:p>
-                      <a:pPr marL="0" indent="0" algn="l">
+                      <a:pPr marL="108000" indent="0" algn="l">
                         <a:spcBef>
-                          <a:spcPts val="0"/>
+                          <a:spcPts val="300"/>
                         </a:spcBef>
                         <a:spcAft>
                           <a:spcPts val="0"/>
@@ -15175,12 +15432,12 @@
                         </a:tabLst>
                       </a:pPr>
                       <a:r>
-                        <a:rPr lang="fr-CA" sz="1600" dirty="0">
+                        <a:rPr lang="fr-CA" sz="1300" dirty="0">
                           <a:effectLst/>
                         </a:rPr>
-                        <a:t>Théorie des jeux</a:t>
+                        <a:t>Recherche locale et optimisation</a:t>
                       </a:r>
-                      <a:endParaRPr lang="en-US" sz="1600" b="1" dirty="0">
+                      <a:endParaRPr lang="en-CA" sz="1300" b="1" dirty="0">
                         <a:effectLst/>
                         <a:latin typeface="Times New Roman" panose="02020603050405020304" pitchFamily="18" charset="0"/>
                         <a:ea typeface="Times New Roman" panose="02020603050405020304" pitchFamily="18" charset="0"/>
@@ -15188,23 +15445,23 @@
                       </a:endParaRPr>
                     </a:p>
                   </a:txBody>
-                  <a:tcPr marL="62089" marR="62089" marT="0" marB="0"/>
+                  <a:tcPr marL="18945" marR="18945" marT="0" marB="0"/>
                 </a:tc>
                 <a:extLst>
                   <a:ext uri="{0D108BD9-81ED-4DB2-BD59-A6C34878D82A}">
-                    <a16:rowId xmlns:a16="http://schemas.microsoft.com/office/drawing/2014/main" val="2808709727"/>
+                    <a16:rowId xmlns:a16="http://schemas.microsoft.com/office/drawing/2014/main" val="3997893267"/>
                   </a:ext>
                 </a:extLst>
               </a:tr>
-              <a:tr h="453302">
+              <a:tr h="436837">
                 <a:tc>
                   <a:txBody>
                     <a:bodyPr/>
                     <a:lstStyle/>
                     <a:p>
-                      <a:pPr marL="457200" indent="-228600" algn="l">
+                      <a:pPr marL="108000" indent="0" algn="l">
                         <a:spcBef>
-                          <a:spcPts val="600"/>
+                          <a:spcPts val="300"/>
                         </a:spcBef>
                         <a:spcAft>
                           <a:spcPts val="0"/>
@@ -15216,12 +15473,12 @@
                         </a:tabLst>
                       </a:pPr>
                       <a:r>
-                        <a:rPr lang="fr-CA" sz="1600">
+                        <a:rPr lang="fr-CA" sz="1300">
                           <a:effectLst/>
                         </a:rPr>
                         <a:t>Quiz 3</a:t>
                       </a:r>
-                      <a:endParaRPr lang="en-US" sz="1600" b="1">
+                      <a:endParaRPr lang="en-CA" sz="1300" b="1">
                         <a:effectLst/>
                         <a:latin typeface="Times New Roman" panose="02020603050405020304" pitchFamily="18" charset="0"/>
                         <a:ea typeface="Times New Roman" panose="02020603050405020304" pitchFamily="18" charset="0"/>
@@ -15229,16 +15486,16 @@
                       </a:endParaRPr>
                     </a:p>
                   </a:txBody>
-                  <a:tcPr marL="62089" marR="62089" marT="0" marB="0"/>
+                  <a:tcPr marL="18945" marR="18945" marT="0" marB="0"/>
                 </a:tc>
                 <a:tc>
                   <a:txBody>
                     <a:bodyPr/>
                     <a:lstStyle/>
                     <a:p>
-                      <a:pPr marL="0" indent="0" algn="l">
+                      <a:pPr marL="108000" indent="0" algn="l">
                         <a:spcBef>
-                          <a:spcPts val="0"/>
+                          <a:spcPts val="300"/>
                         </a:spcBef>
                         <a:spcAft>
                           <a:spcPts val="0"/>
@@ -15250,12 +15507,12 @@
                         </a:tabLst>
                       </a:pPr>
                       <a:r>
-                        <a:rPr lang="fr-CA" sz="1600">
+                        <a:rPr lang="fr-CA" sz="1300">
                           <a:effectLst/>
                         </a:rPr>
-                        <a:t>Mardi 24 juillet</a:t>
+                        <a:t>Vendredi 5 avril</a:t>
                       </a:r>
-                      <a:endParaRPr lang="en-US" sz="1600" b="1">
+                      <a:endParaRPr lang="en-CA" sz="1300" b="1">
                         <a:effectLst/>
                         <a:latin typeface="Times New Roman" panose="02020603050405020304" pitchFamily="18" charset="0"/>
                         <a:ea typeface="Times New Roman" panose="02020603050405020304" pitchFamily="18" charset="0"/>
@@ -15263,16 +15520,16 @@
                       </a:endParaRPr>
                     </a:p>
                   </a:txBody>
-                  <a:tcPr marL="62089" marR="62089" marT="0" marB="0"/>
+                  <a:tcPr marL="18945" marR="18945" marT="0" marB="0"/>
                 </a:tc>
                 <a:tc>
                   <a:txBody>
                     <a:bodyPr/>
                     <a:lstStyle/>
                     <a:p>
-                      <a:pPr marL="0" indent="0" algn="l">
+                      <a:pPr marL="108000" indent="0" algn="l">
                         <a:spcBef>
-                          <a:spcPts val="0"/>
+                          <a:spcPts val="300"/>
                         </a:spcBef>
                         <a:spcAft>
                           <a:spcPts val="0"/>
@@ -15284,12 +15541,12 @@
                         </a:tabLst>
                       </a:pPr>
                       <a:r>
-                        <a:rPr lang="fr-CA" sz="1600" dirty="0">
+                        <a:rPr lang="fr-CA" sz="1300">
                           <a:effectLst/>
                         </a:rPr>
-                        <a:t>Lundi 7 août à minuit</a:t>
+                        <a:t>Lundi 15 avril à minuit</a:t>
                       </a:r>
-                      <a:endParaRPr lang="en-US" sz="1600" b="1" dirty="0">
+                      <a:endParaRPr lang="en-CA" sz="1300" b="1">
                         <a:effectLst/>
                         <a:latin typeface="Times New Roman" panose="02020603050405020304" pitchFamily="18" charset="0"/>
                         <a:ea typeface="Times New Roman" panose="02020603050405020304" pitchFamily="18" charset="0"/>
@@ -15297,16 +15554,16 @@
                       </a:endParaRPr>
                     </a:p>
                   </a:txBody>
-                  <a:tcPr marL="62089" marR="62089" marT="0" marB="0"/>
+                  <a:tcPr marL="18945" marR="18945" marT="0" marB="0"/>
                 </a:tc>
                 <a:tc>
                   <a:txBody>
                     <a:bodyPr/>
                     <a:lstStyle/>
                     <a:p>
-                      <a:pPr marL="457200" indent="-228600" algn="ctr">
+                      <a:pPr marL="108000" indent="0" algn="ctr">
                         <a:spcBef>
-                          <a:spcPts val="600"/>
+                          <a:spcPts val="300"/>
                         </a:spcBef>
                         <a:spcAft>
                           <a:spcPts val="0"/>
@@ -15318,12 +15575,12 @@
                         </a:tabLst>
                       </a:pPr>
                       <a:r>
-                        <a:rPr lang="fr-CA" sz="1600">
+                        <a:rPr lang="fr-CA" sz="1300">
                           <a:effectLst/>
                         </a:rPr>
                         <a:t>3 %</a:t>
                       </a:r>
-                      <a:endParaRPr lang="en-US" sz="1600" b="1">
+                      <a:endParaRPr lang="en-CA" sz="1300" b="1">
                         <a:effectLst/>
                         <a:latin typeface="Times New Roman" panose="02020603050405020304" pitchFamily="18" charset="0"/>
                         <a:ea typeface="Times New Roman" panose="02020603050405020304" pitchFamily="18" charset="0"/>
@@ -15331,16 +15588,16 @@
                       </a:endParaRPr>
                     </a:p>
                   </a:txBody>
-                  <a:tcPr marL="62089" marR="62089" marT="0" marB="0"/>
+                  <a:tcPr marL="18945" marR="18945" marT="0" marB="0"/>
                 </a:tc>
                 <a:tc>
                   <a:txBody>
                     <a:bodyPr/>
                     <a:lstStyle/>
                     <a:p>
-                      <a:pPr marL="0" indent="0" algn="l">
+                      <a:pPr marL="108000" indent="0" algn="l">
                         <a:spcBef>
-                          <a:spcPts val="0"/>
+                          <a:spcPts val="300"/>
                         </a:spcBef>
                         <a:spcAft>
                           <a:spcPts val="0"/>
@@ -15352,12 +15609,12 @@
                         </a:tabLst>
                       </a:pPr>
                       <a:r>
-                        <a:rPr lang="fr-CA" sz="1600" dirty="0">
+                        <a:rPr lang="fr-CA" sz="1300" dirty="0">
                           <a:effectLst/>
                         </a:rPr>
                         <a:t>Raisonnement logique</a:t>
                       </a:r>
-                      <a:endParaRPr lang="en-US" sz="1600" b="1" dirty="0">
+                      <a:endParaRPr lang="en-CA" sz="1300" b="1" dirty="0">
                         <a:effectLst/>
                         <a:latin typeface="Times New Roman" panose="02020603050405020304" pitchFamily="18" charset="0"/>
                         <a:ea typeface="Times New Roman" panose="02020603050405020304" pitchFamily="18" charset="0"/>
@@ -15365,11 +15622,11 @@
                       </a:endParaRPr>
                     </a:p>
                   </a:txBody>
-                  <a:tcPr marL="62089" marR="62089" marT="0" marB="0"/>
+                  <a:tcPr marL="18945" marR="18945" marT="0" marB="0"/>
                 </a:tc>
                 <a:extLst>
                   <a:ext uri="{0D108BD9-81ED-4DB2-BD59-A6C34878D82A}">
-                    <a16:rowId xmlns:a16="http://schemas.microsoft.com/office/drawing/2014/main" val="686335739"/>
+                    <a16:rowId xmlns:a16="http://schemas.microsoft.com/office/drawing/2014/main" val="342977583"/>
                   </a:ext>
                 </a:extLst>
               </a:tr>
@@ -16901,15 +17158,15 @@
         </p:nvSpPr>
         <p:spPr>
           <a:xfrm>
-            <a:off x="457200" y="1373188"/>
-            <a:ext cx="8300720" cy="1277931"/>
+            <a:off x="463923" y="1514878"/>
+            <a:ext cx="8350624" cy="949982"/>
           </a:xfrm>
         </p:spPr>
         <p:txBody>
           <a:bodyPr/>
           <a:lstStyle/>
           <a:p>
-            <a:pPr marL="457200" lvl="1" indent="0" eaLnBrk="1" hangingPunct="1">
+            <a:pPr marL="0" lvl="1" indent="0" eaLnBrk="1" hangingPunct="1">
               <a:buNone/>
             </a:pPr>
             <a:r>
@@ -16952,37 +17209,13 @@
               <a:rPr lang="fr-FR" altLang="en-US" dirty="0">
                 <a:ea typeface="ＭＳ Ｐゴシック" pitchFamily="34" charset="-128"/>
               </a:rPr>
-              <a:t> permettant aux machines de  </a:t>
+              <a:t> permettant aux machines de </a:t>
             </a:r>
             <a:r>
               <a:rPr lang="fr-FR" altLang="en-US" b="1" dirty="0">
                 <a:ea typeface="ＭＳ Ｐゴシック" pitchFamily="34" charset="-128"/>
               </a:rPr>
-              <a:t>percevoir</a:t>
-            </a:r>
-            <a:r>
-              <a:rPr lang="fr-FR" altLang="en-US" dirty="0">
-                <a:ea typeface="ＭＳ Ｐゴシック" pitchFamily="34" charset="-128"/>
-              </a:rPr>
-              <a:t>, </a:t>
-            </a:r>
-            <a:r>
-              <a:rPr lang="fr-FR" altLang="en-US" b="1" dirty="0">
-                <a:ea typeface="ＭＳ Ｐゴシック" pitchFamily="34" charset="-128"/>
-              </a:rPr>
-              <a:t>comprendre</a:t>
-            </a:r>
-            <a:r>
-              <a:rPr lang="fr-FR" altLang="en-US" dirty="0">
-                <a:ea typeface="ＭＳ Ｐゴシック" pitchFamily="34" charset="-128"/>
-              </a:rPr>
-              <a:t>, </a:t>
-            </a:r>
-            <a:r>
-              <a:rPr lang="fr-FR" altLang="en-US" b="1" dirty="0">
-                <a:ea typeface="ＭＳ Ｐゴシック" pitchFamily="34" charset="-128"/>
-              </a:rPr>
-              <a:t>prédire, décider, raisonner, planifier </a:t>
+              <a:t>percevoir, comprendre, raisonner, décider </a:t>
             </a:r>
             <a:r>
               <a:rPr lang="fr-FR" altLang="en-US" dirty="0">
@@ -16996,14 +17229,6 @@
               </a:rPr>
               <a:t>agir</a:t>
             </a:r>
-            <a:endParaRPr lang="fr-FR" altLang="en-US" dirty="0">
-              <a:ea typeface="ＭＳ Ｐゴシック" pitchFamily="34" charset="-128"/>
-            </a:endParaRPr>
-          </a:p>
-          <a:p>
-            <a:pPr marL="457200" lvl="1" indent="0" eaLnBrk="1" hangingPunct="1">
-              <a:buNone/>
-            </a:pPr>
             <a:endParaRPr lang="fr-FR" altLang="en-US" dirty="0">
               <a:ea typeface="ＭＳ Ｐゴシック" pitchFamily="34" charset="-128"/>
             </a:endParaRPr>
@@ -17513,7 +17738,7 @@
         </p:blipFill>
         <p:spPr>
           <a:xfrm>
-            <a:off x="6554834" y="2961602"/>
+            <a:off x="6575005" y="2932107"/>
             <a:ext cx="1852628" cy="1037471"/>
           </a:xfrm>
           <a:prstGeom prst="rect">
@@ -17550,7 +17775,7 @@
         </p:blipFill>
         <p:spPr bwMode="auto">
           <a:xfrm>
-            <a:off x="1121926" y="3104928"/>
+            <a:off x="1142097" y="3075433"/>
             <a:ext cx="1377516" cy="788477"/>
           </a:xfrm>
           <a:prstGeom prst="rect">
@@ -17597,7 +17822,7 @@
         </p:blipFill>
         <p:spPr bwMode="auto">
           <a:xfrm>
-            <a:off x="3529093" y="3089855"/>
+            <a:off x="3549264" y="3060360"/>
             <a:ext cx="1183872" cy="788477"/>
           </a:xfrm>
           <a:prstGeom prst="rect">
@@ -17637,7 +17862,7 @@
         </p:blipFill>
         <p:spPr>
           <a:xfrm>
-            <a:off x="1278886" y="4302871"/>
+            <a:off x="1299057" y="4273376"/>
             <a:ext cx="1390664" cy="1091671"/>
           </a:xfrm>
           <a:prstGeom prst="rect">
@@ -17667,7 +17892,7 @@
         </p:blipFill>
         <p:spPr>
           <a:xfrm>
-            <a:off x="3110916" y="4389018"/>
+            <a:off x="3131087" y="4359523"/>
             <a:ext cx="1457909" cy="816429"/>
           </a:xfrm>
           <a:prstGeom prst="rect">
@@ -17703,7 +17928,7 @@
         </p:blipFill>
         <p:spPr>
           <a:xfrm>
-            <a:off x="5267625" y="3053956"/>
+            <a:off x="5287796" y="3024461"/>
             <a:ext cx="949982" cy="949982"/>
           </a:xfrm>
           <a:prstGeom prst="rect">
@@ -17740,7 +17965,7 @@
         </p:blipFill>
         <p:spPr>
           <a:xfrm>
-            <a:off x="5805239" y="4459990"/>
+            <a:off x="5825410" y="4430495"/>
             <a:ext cx="2343389" cy="859032"/>
           </a:xfrm>
           <a:prstGeom prst="rect">
@@ -20610,7 +20835,7 @@
 </file>
 
 <file path=ppt/slides/slide7.xml><?xml version="1.0" encoding="utf-8"?>
-<p:sld xmlns:a="http://schemas.openxmlformats.org/drawingml/2006/main" xmlns:r="http://schemas.openxmlformats.org/officeDocument/2006/relationships" xmlns:p="http://schemas.openxmlformats.org/presentationml/2006/main">
+<p:sld xmlns:a="http://schemas.openxmlformats.org/drawingml/2006/main" xmlns:r="http://schemas.openxmlformats.org/officeDocument/2006/relationships" xmlns:p="http://schemas.openxmlformats.org/presentationml/2006/main" show="0">
   <p:cSld>
     <p:spTree>
       <p:nvGrpSpPr>
@@ -24763,22 +24988,15 @@
           <a:p>
             <a:pPr algn="ctr"/>
             <a:r>
-              <a:rPr lang="fr-CA" sz="1600" err="1">
+              <a:rPr lang="fr-CA" sz="1600" dirty="0">
                 <a:solidFill>
                   <a:schemeClr val="accent1">
                     <a:lumMod val="50000"/>
                   </a:schemeClr>
                 </a:solidFill>
               </a:rPr>
-              <a:t>Heurisitiques</a:t>
+              <a:t>Heuristiques</a:t>
             </a:r>
-            <a:endParaRPr lang="fr-CA" sz="1600">
-              <a:solidFill>
-                <a:schemeClr val="accent1">
-                  <a:lumMod val="50000"/>
-                </a:schemeClr>
-              </a:solidFill>
-            </a:endParaRPr>
           </a:p>
         </p:txBody>
       </p:sp>
@@ -26070,7 +26288,7 @@
               </a:lnSpc>
             </a:pPr>
             <a:r>
-              <a:rPr lang="fr-CA" altLang="ko-KR">
+              <a:rPr lang="fr-CA" altLang="ko-KR" dirty="0">
                 <a:ea typeface="Gulim" pitchFamily="34" charset="-127"/>
               </a:rPr>
               <a:t>Acquérir </a:t>
@@ -26083,10 +26301,10 @@
               </a:lnSpc>
             </a:pPr>
             <a:r>
-              <a:rPr lang="fr-CA" altLang="ko-KR" sz="2000">
+              <a:rPr lang="fr-CA" altLang="ko-KR" sz="2000" dirty="0">
                 <a:ea typeface="Gulim" pitchFamily="34" charset="-127"/>
               </a:rPr>
-              <a:t>Les principes et les techniques algorithmes de base pour développer des applications d’IA</a:t>
+              <a:t>Les principes et les techniques de base sur lesquels sont fondés les algorithmes d’IA</a:t>
             </a:r>
           </a:p>
           <a:p>
@@ -26097,7 +26315,7 @@
               <a:buFont typeface="Monotype Sorts" pitchFamily="2" charset="2"/>
               <a:buNone/>
             </a:pPr>
-            <a:endParaRPr lang="fr-CA" altLang="ko-KR" sz="2000">
+            <a:endParaRPr lang="fr-CA" altLang="ko-KR" sz="2000" dirty="0">
               <a:ea typeface="Gulim" pitchFamily="34" charset="-127"/>
             </a:endParaRPr>
           </a:p>
@@ -26108,7 +26326,7 @@
               </a:lnSpc>
             </a:pPr>
             <a:r>
-              <a:rPr lang="fr-CA" altLang="ko-KR">
+              <a:rPr lang="fr-CA" altLang="ko-KR" dirty="0">
                 <a:ea typeface="Gulim" pitchFamily="34" charset="-127"/>
               </a:rPr>
               <a:t>Comment?</a:t>
@@ -26121,10 +26339,10 @@
               </a:lnSpc>
             </a:pPr>
             <a:r>
-              <a:rPr lang="fr-CA" altLang="ko-KR" sz="2000">
+              <a:rPr lang="fr-CA" altLang="ko-KR" sz="2000" dirty="0">
                 <a:ea typeface="Gulim" pitchFamily="34" charset="-127"/>
               </a:rPr>
-              <a:t>Introduction des types de problèmes, de concepts et d’algorithmes de base</a:t>
+              <a:t>Cours magistral: Concepts et algorithmes</a:t>
             </a:r>
           </a:p>
           <a:p>
@@ -26134,10 +26352,10 @@
               </a:lnSpc>
             </a:pPr>
             <a:r>
-              <a:rPr lang="fr-CA" altLang="ko-KR" sz="2000">
+              <a:rPr lang="fr-CA" altLang="ko-KR" sz="2000" dirty="0">
                 <a:ea typeface="Gulim" pitchFamily="34" charset="-127"/>
               </a:rPr>
-              <a:t>5 travaux pratiques de programmation</a:t>
+              <a:t>5 travaux de programmation</a:t>
             </a:r>
           </a:p>
           <a:p>
@@ -26147,10 +26365,23 @@
               </a:lnSpc>
             </a:pPr>
             <a:r>
-              <a:rPr lang="fr-CA" altLang="ko-KR" sz="2000">
+              <a:rPr lang="fr-CA" altLang="ko-KR" sz="2000" dirty="0">
                 <a:ea typeface="Gulim" pitchFamily="34" charset="-127"/>
               </a:rPr>
-              <a:t>3 devoirs</a:t>
+              <a:t>3 quiz sur la théorie</a:t>
+            </a:r>
+          </a:p>
+          <a:p>
+            <a:pPr lvl="1">
+              <a:lnSpc>
+                <a:spcPct val="120000"/>
+              </a:lnSpc>
+            </a:pPr>
+            <a:r>
+              <a:rPr lang="fr-CA" altLang="ko-KR" sz="2000" dirty="0">
+                <a:ea typeface="Gulim" pitchFamily="34" charset="-127"/>
+              </a:rPr>
+              <a:t>Exercices personnels </a:t>
             </a:r>
           </a:p>
         </p:txBody>
@@ -28122,19 +28353,8 @@
 </file>
 
 <file path=customXml/item1.xml><?xml version="1.0" encoding="utf-8"?>
-<p:properties xmlns:p="http://schemas.microsoft.com/office/2006/metadata/properties" xmlns:xsi="http://www.w3.org/2001/XMLSchema-instance" xmlns:pc="http://schemas.microsoft.com/office/infopath/2007/PartnerControls">
-  <documentManagement>
-    <lcf76f155ced4ddcb4097134ff3c332f xmlns="be95ad7f-f2d3-4ad5-827d-a3392f6d419f">
-      <Terms xmlns="http://schemas.microsoft.com/office/infopath/2007/PartnerControls"/>
-    </lcf76f155ced4ddcb4097134ff3c332f>
-    <TaxCatchAll xmlns="461e6b72-1c26-445f-8625-322369705492" xsi:nil="true"/>
-  </documentManagement>
-</p:properties>
-</file>
-
-<file path=customXml/item2.xml><?xml version="1.0" encoding="utf-8"?>
-<ct:contentTypeSchema xmlns:ct="http://schemas.microsoft.com/office/2006/metadata/contentType" xmlns:ma="http://schemas.microsoft.com/office/2006/metadata/properties/metaAttributes" ct:_="" ma:_="" ma:contentTypeName="Document" ma:contentTypeID="0x01010081A5D1C58639CC438A0985A5163AD7E3" ma:contentTypeVersion="16" ma:contentTypeDescription="Crée un document." ma:contentTypeScope="" ma:versionID="adde1713dad0237bebe5b7f0a48ecfba">
-  <xsd:schema xmlns:xsd="http://www.w3.org/2001/XMLSchema" xmlns:xs="http://www.w3.org/2001/XMLSchema" xmlns:p="http://schemas.microsoft.com/office/2006/metadata/properties" xmlns:ns2="be95ad7f-f2d3-4ad5-827d-a3392f6d419f" xmlns:ns3="461e6b72-1c26-445f-8625-322369705492" targetNamespace="http://schemas.microsoft.com/office/2006/metadata/properties" ma:root="true" ma:fieldsID="34d9627e19b6e0ed2eb421ed6e1fb46a" ns2:_="" ns3:_="">
+<ct:contentTypeSchema xmlns:ct="http://schemas.microsoft.com/office/2006/metadata/contentType" xmlns:ma="http://schemas.microsoft.com/office/2006/metadata/properties/metaAttributes" ct:_="" ma:_="" ma:contentTypeName="Document" ma:contentTypeID="0x01010081A5D1C58639CC438A0985A5163AD7E3" ma:contentTypeVersion="17" ma:contentTypeDescription="Crée un document." ma:contentTypeScope="" ma:versionID="7795556d6530b0b9480380495134c4db">
+  <xsd:schema xmlns:xsd="http://www.w3.org/2001/XMLSchema" xmlns:xs="http://www.w3.org/2001/XMLSchema" xmlns:p="http://schemas.microsoft.com/office/2006/metadata/properties" xmlns:ns2="be95ad7f-f2d3-4ad5-827d-a3392f6d419f" xmlns:ns3="461e6b72-1c26-445f-8625-322369705492" targetNamespace="http://schemas.microsoft.com/office/2006/metadata/properties" ma:root="true" ma:fieldsID="9d9b2d3b47b01b6398608d65909208f7" ns2:_="" ns3:_="">
     <xsd:import namespace="be95ad7f-f2d3-4ad5-827d-a3392f6d419f"/>
     <xsd:import namespace="461e6b72-1c26-445f-8625-322369705492"/>
     <xsd:element name="properties">
@@ -28157,6 +28377,7 @@
                 <xsd:element ref="ns2:lcf76f155ced4ddcb4097134ff3c332f" minOccurs="0"/>
                 <xsd:element ref="ns3:TaxCatchAll" minOccurs="0"/>
                 <xsd:element ref="ns2:MediaServiceLocation" minOccurs="0"/>
+                <xsd:element ref="ns2:MediaServiceObjectDetectorVersions" minOccurs="0"/>
               </xsd:all>
             </xsd:complexType>
           </xsd:element>
@@ -28224,6 +28445,11 @@
       </xsd:complexType>
     </xsd:element>
     <xsd:element name="MediaServiceLocation" ma:index="22" nillable="true" ma:displayName="Location" ma:internalName="MediaServiceLocation" ma:readOnly="true">
+      <xsd:simpleType>
+        <xsd:restriction base="dms:Text"/>
+      </xsd:simpleType>
+    </xsd:element>
+    <xsd:element name="MediaServiceObjectDetectorVersions" ma:index="23" nillable="true" ma:displayName="MediaServiceObjectDetectorVersions" ma:hidden="true" ma:indexed="true" ma:internalName="MediaServiceObjectDetectorVersions" ma:readOnly="true">
       <xsd:simpleType>
         <xsd:restriction base="dms:Text"/>
       </xsd:simpleType>
@@ -28369,6 +28595,17 @@
 </ct:contentTypeSchema>
 </file>
 
+<file path=customXml/item2.xml><?xml version="1.0" encoding="utf-8"?>
+<p:properties xmlns:p="http://schemas.microsoft.com/office/2006/metadata/properties" xmlns:xsi="http://www.w3.org/2001/XMLSchema-instance" xmlns:pc="http://schemas.microsoft.com/office/infopath/2007/PartnerControls">
+  <documentManagement>
+    <lcf76f155ced4ddcb4097134ff3c332f xmlns="be95ad7f-f2d3-4ad5-827d-a3392f6d419f">
+      <Terms xmlns="http://schemas.microsoft.com/office/infopath/2007/PartnerControls"/>
+    </lcf76f155ced4ddcb4097134ff3c332f>
+    <TaxCatchAll xmlns="461e6b72-1c26-445f-8625-322369705492" xsi:nil="true"/>
+  </documentManagement>
+</p:properties>
+</file>
+
 <file path=customXml/item3.xml><?xml version="1.0" encoding="utf-8"?>
 <?mso-contentType ?>
 <FormTemplates xmlns="http://schemas.microsoft.com/sharepoint/v3/contenttype/forms">
@@ -28379,6 +28616,25 @@
 </file>
 
 <file path=customXml/itemProps1.xml><?xml version="1.0" encoding="utf-8"?>
+<ds:datastoreItem xmlns:ds="http://schemas.openxmlformats.org/officeDocument/2006/customXml" ds:itemID="{3A6217AE-79D1-4DDF-AF98-FD7A08F21A2A}">
+  <ds:schemaRefs>
+    <ds:schemaRef ds:uri="http://schemas.microsoft.com/office/2006/metadata/contentType"/>
+    <ds:schemaRef ds:uri="http://schemas.microsoft.com/office/2006/metadata/properties/metaAttributes"/>
+    <ds:schemaRef ds:uri="http://www.w3.org/2001/XMLSchema"/>
+    <ds:schemaRef ds:uri="http://schemas.microsoft.com/office/2006/metadata/properties"/>
+    <ds:schemaRef ds:uri="be95ad7f-f2d3-4ad5-827d-a3392f6d419f"/>
+    <ds:schemaRef ds:uri="461e6b72-1c26-445f-8625-322369705492"/>
+    <ds:schemaRef ds:uri="http://schemas.microsoft.com/office/2006/documentManagement/types"/>
+    <ds:schemaRef ds:uri="http://schemas.microsoft.com/office/infopath/2007/PartnerControls"/>
+    <ds:schemaRef ds:uri="http://schemas.openxmlformats.org/package/2006/metadata/core-properties"/>
+    <ds:schemaRef ds:uri="http://purl.org/dc/elements/1.1/"/>
+    <ds:schemaRef ds:uri="http://purl.org/dc/terms/"/>
+    <ds:schemaRef ds:uri="http://schemas.microsoft.com/internal/obd"/>
+  </ds:schemaRefs>
+</ds:datastoreItem>
+</file>
+
+<file path=customXml/itemProps2.xml><?xml version="1.0" encoding="utf-8"?>
 <ds:datastoreItem xmlns:ds="http://schemas.openxmlformats.org/officeDocument/2006/customXml" ds:itemID="{24DA2006-6440-4976-BC53-B7AAE5097698}">
   <ds:schemaRefs>
     <ds:schemaRef ds:uri="461e6b72-1c26-445f-8625-322369705492"/>
@@ -28395,25 +28651,6 @@
 </ds:datastoreItem>
 </file>
 
-<file path=customXml/itemProps2.xml><?xml version="1.0" encoding="utf-8"?>
-<ds:datastoreItem xmlns:ds="http://schemas.openxmlformats.org/officeDocument/2006/customXml" ds:itemID="{850017F6-8206-48C9-8293-41EE07368398}">
-  <ds:schemaRefs>
-    <ds:schemaRef ds:uri="461e6b72-1c26-445f-8625-322369705492"/>
-    <ds:schemaRef ds:uri="be95ad7f-f2d3-4ad5-827d-a3392f6d419f"/>
-    <ds:schemaRef ds:uri="http://purl.org/dc/elements/1.1/"/>
-    <ds:schemaRef ds:uri="http://purl.org/dc/terms/"/>
-    <ds:schemaRef ds:uri="http://schemas.microsoft.com/internal/obd"/>
-    <ds:schemaRef ds:uri="http://schemas.microsoft.com/office/2006/documentManagement/types"/>
-    <ds:schemaRef ds:uri="http://schemas.microsoft.com/office/2006/metadata/contentType"/>
-    <ds:schemaRef ds:uri="http://schemas.microsoft.com/office/2006/metadata/properties"/>
-    <ds:schemaRef ds:uri="http://schemas.microsoft.com/office/2006/metadata/properties/metaAttributes"/>
-    <ds:schemaRef ds:uri="http://schemas.microsoft.com/office/infopath/2007/PartnerControls"/>
-    <ds:schemaRef ds:uri="http://schemas.openxmlformats.org/package/2006/metadata/core-properties"/>
-    <ds:schemaRef ds:uri="http://www.w3.org/2001/XMLSchema"/>
-  </ds:schemaRefs>
-</ds:datastoreItem>
-</file>
-
 <file path=customXml/itemProps3.xml><?xml version="1.0" encoding="utf-8"?>
 <ds:datastoreItem xmlns:ds="http://schemas.openxmlformats.org/officeDocument/2006/customXml" ds:itemID="{9974C2F4-8CCD-406C-A794-600FD2FA860F}">
   <ds:schemaRefs>

</xml_diff>